<commit_message>
working on reasearch works
</commit_message>
<xml_diff>
--- a/sp_2020.pptx
+++ b/sp_2020.pptx
@@ -6,20 +6,23 @@
     <p:sldMasterId id="2147483764" r:id="rId2"/>
   </p:sldMasterIdLst>
   <p:notesMasterIdLst>
-    <p:notesMasterId r:id="rId11"/>
+    <p:notesMasterId r:id="rId14"/>
   </p:notesMasterIdLst>
   <p:handoutMasterIdLst>
-    <p:handoutMasterId r:id="rId12"/>
+    <p:handoutMasterId r:id="rId15"/>
   </p:handoutMasterIdLst>
   <p:sldIdLst>
     <p:sldId id="800" r:id="rId3"/>
     <p:sldId id="803" r:id="rId4"/>
-    <p:sldId id="805" r:id="rId5"/>
+    <p:sldId id="826" r:id="rId5"/>
     <p:sldId id="821" r:id="rId6"/>
-    <p:sldId id="822" r:id="rId7"/>
-    <p:sldId id="823" r:id="rId8"/>
-    <p:sldId id="824" r:id="rId9"/>
-    <p:sldId id="825" r:id="rId10"/>
+    <p:sldId id="828" r:id="rId7"/>
+    <p:sldId id="829" r:id="rId8"/>
+    <p:sldId id="827" r:id="rId9"/>
+    <p:sldId id="822" r:id="rId10"/>
+    <p:sldId id="823" r:id="rId11"/>
+    <p:sldId id="824" r:id="rId12"/>
+    <p:sldId id="825" r:id="rId13"/>
   </p:sldIdLst>
   <p:sldSz cx="13817600" cy="7772400"/>
   <p:notesSz cx="6858000" cy="9144000"/>
@@ -271,7 +274,7 @@
                   <a:srgbClr val="F16322"/>
                 </a:solidFill>
               </a:rPr>
-              <a:t>4/8/2020</a:t>
+              <a:t>7/12/2020</a:t>
             </a:fld>
             <a:endParaRPr lang="en-US" dirty="0">
               <a:solidFill>
@@ -430,7 +433,7 @@
             <a:fld id="{DBF7D493-8EEB-7E45-916B-5FBC49ABC710}" type="datetimeFigureOut">
               <a:rPr lang="en-US" smtClean="0"/>
               <a:pPr/>
-              <a:t>4/8/2020</a:t>
+              <a:t>7/12/2020</a:t>
             </a:fld>
             <a:endParaRPr lang="en-US" dirty="0"/>
           </a:p>
@@ -780,7 +783,7 @@
                 <a:latin typeface="OfficinaSansITCStd Book"/>
                 <a:cs typeface="OfficinaSansITCStd Book"/>
               </a:rPr>
-              <a:t>3</a:t>
+              <a:t>4</a:t>
             </a:fld>
             <a:endParaRPr lang="en-US" dirty="0">
               <a:solidFill>
@@ -795,7 +798,7 @@
     </p:spTree>
     <p:extLst>
       <p:ext uri="{BB962C8B-B14F-4D97-AF65-F5344CB8AC3E}">
-        <p14:creationId xmlns:p14="http://schemas.microsoft.com/office/powerpoint/2010/main" val="566776412"/>
+        <p14:creationId xmlns:p14="http://schemas.microsoft.com/office/powerpoint/2010/main" val="2059406493"/>
       </p:ext>
     </p:extLst>
   </p:cSld>
@@ -876,7 +879,7 @@
                 <a:latin typeface="OfficinaSansITCStd Book"/>
                 <a:cs typeface="OfficinaSansITCStd Book"/>
               </a:rPr>
-              <a:t>4</a:t>
+              <a:t>8</a:t>
             </a:fld>
             <a:endParaRPr lang="en-US" dirty="0">
               <a:solidFill>
@@ -891,7 +894,7 @@
     </p:spTree>
     <p:extLst>
       <p:ext uri="{BB962C8B-B14F-4D97-AF65-F5344CB8AC3E}">
-        <p14:creationId xmlns:p14="http://schemas.microsoft.com/office/powerpoint/2010/main" val="2059406493"/>
+        <p14:creationId xmlns:p14="http://schemas.microsoft.com/office/powerpoint/2010/main" val="2732658428"/>
       </p:ext>
     </p:extLst>
   </p:cSld>
@@ -972,103 +975,7 @@
                 <a:latin typeface="OfficinaSansITCStd Book"/>
                 <a:cs typeface="OfficinaSansITCStd Book"/>
               </a:rPr>
-              <a:t>5</a:t>
-            </a:fld>
-            <a:endParaRPr lang="en-US" dirty="0">
-              <a:solidFill>
-                <a:schemeClr val="bg1"/>
-              </a:solidFill>
-              <a:latin typeface="OfficinaSansITCStd Book"/>
-              <a:cs typeface="OfficinaSansITCStd Book"/>
-            </a:endParaRPr>
-          </a:p>
-        </p:txBody>
-      </p:sp>
-    </p:spTree>
-    <p:extLst>
-      <p:ext uri="{BB962C8B-B14F-4D97-AF65-F5344CB8AC3E}">
-        <p14:creationId xmlns:p14="http://schemas.microsoft.com/office/powerpoint/2010/main" val="2732658428"/>
-      </p:ext>
-    </p:extLst>
-  </p:cSld>
-  <p:clrMapOvr>
-    <a:masterClrMapping/>
-  </p:clrMapOvr>
-</p:notes>
-</file>
-
-<file path=ppt/notesSlides/notesSlide4.xml><?xml version="1.0" encoding="utf-8"?>
-<p:notes xmlns:a="http://schemas.openxmlformats.org/drawingml/2006/main" xmlns:r="http://schemas.openxmlformats.org/officeDocument/2006/relationships" xmlns:p="http://schemas.openxmlformats.org/presentationml/2006/main">
-  <p:cSld>
-    <p:spTree>
-      <p:nvGrpSpPr>
-        <p:cNvPr id="1" name=""/>
-        <p:cNvGrpSpPr/>
-        <p:nvPr/>
-      </p:nvGrpSpPr>
-      <p:grpSpPr>
-        <a:xfrm>
-          <a:off x="0" y="0"/>
-          <a:ext cx="0" cy="0"/>
-          <a:chOff x="0" y="0"/>
-          <a:chExt cx="0" cy="0"/>
-        </a:xfrm>
-      </p:grpSpPr>
-      <p:sp>
-        <p:nvSpPr>
-          <p:cNvPr id="2" name="幻灯片图像占位符 1"/>
-          <p:cNvSpPr>
-            <a:spLocks noGrp="1" noRot="1" noChangeAspect="1"/>
-          </p:cNvSpPr>
-          <p:nvPr>
-            <p:ph type="sldImg"/>
-          </p:nvPr>
-        </p:nvSpPr>
-        <p:spPr/>
-      </p:sp>
-      <p:sp>
-        <p:nvSpPr>
-          <p:cNvPr id="3" name="备注占位符 2"/>
-          <p:cNvSpPr>
-            <a:spLocks noGrp="1"/>
-          </p:cNvSpPr>
-          <p:nvPr>
-            <p:ph type="body" idx="1"/>
-          </p:nvPr>
-        </p:nvSpPr>
-        <p:spPr/>
-        <p:txBody>
-          <a:bodyPr/>
-          <a:lstStyle/>
-          <a:p>
-            <a:endParaRPr lang="zh-CN" altLang="en-US" dirty="0"/>
-          </a:p>
-        </p:txBody>
-      </p:sp>
-      <p:sp>
-        <p:nvSpPr>
-          <p:cNvPr id="4" name="灯片编号占位符 3"/>
-          <p:cNvSpPr>
-            <a:spLocks noGrp="1"/>
-          </p:cNvSpPr>
-          <p:nvPr>
-            <p:ph type="sldNum" sz="quarter" idx="10"/>
-          </p:nvPr>
-        </p:nvSpPr>
-        <p:spPr/>
-        <p:txBody>
-          <a:bodyPr/>
-          <a:lstStyle/>
-          <a:p>
-            <a:fld id="{D3CEFB91-0E46-0049-83A0-416CE6334971}" type="slidenum">
-              <a:rPr lang="en-US" smtClean="0">
-                <a:solidFill>
-                  <a:schemeClr val="bg1"/>
-                </a:solidFill>
-                <a:latin typeface="OfficinaSansITCStd Book"/>
-                <a:cs typeface="OfficinaSansITCStd Book"/>
-              </a:rPr>
-              <a:t>6</a:t>
+              <a:t>9</a:t>
             </a:fld>
             <a:endParaRPr lang="en-US" dirty="0">
               <a:solidFill>
@@ -3633,6 +3540,504 @@
 </p:sld>
 </file>
 
+<file path=ppt/slides/slide10.xml><?xml version="1.0" encoding="utf-8"?>
+<p:sld xmlns:a="http://schemas.openxmlformats.org/drawingml/2006/main" xmlns:r="http://schemas.openxmlformats.org/officeDocument/2006/relationships" xmlns:p="http://schemas.openxmlformats.org/presentationml/2006/main">
+  <p:cSld>
+    <p:spTree>
+      <p:nvGrpSpPr>
+        <p:cNvPr id="1" name=""/>
+        <p:cNvGrpSpPr/>
+        <p:nvPr/>
+      </p:nvGrpSpPr>
+      <p:grpSpPr>
+        <a:xfrm>
+          <a:off x="0" y="0"/>
+          <a:ext cx="0" cy="0"/>
+          <a:chOff x="0" y="0"/>
+          <a:chExt cx="0" cy="0"/>
+        </a:xfrm>
+      </p:grpSpPr>
+      <mc:AlternateContent xmlns:mc="http://schemas.openxmlformats.org/markup-compatibility/2006" xmlns:a14="http://schemas.microsoft.com/office/drawing/2010/main">
+        <mc:Choice Requires="a14">
+          <p:sp>
+            <p:nvSpPr>
+              <p:cNvPr id="2" name="文本占位符 1"/>
+              <p:cNvSpPr>
+                <a:spLocks noGrp="1"/>
+              </p:cNvSpPr>
+              <p:nvPr>
+                <p:ph type="body" sz="quarter" idx="12"/>
+              </p:nvPr>
+            </p:nvSpPr>
+            <p:spPr>
+              <a:xfrm>
+                <a:off x="610626" y="1633220"/>
+                <a:ext cx="12701026" cy="5380644"/>
+              </a:xfrm>
+            </p:spPr>
+            <p:txBody>
+              <a:bodyPr/>
+              <a:lstStyle/>
+              <a:p>
+                <a:pPr algn="just"/>
+                <a:r>
+                  <a:rPr lang="en-US" altLang="zh-CN" sz="2400" dirty="0" smtClean="0"/>
+                  <a:t>The below figures shows the reach tube computed by </a:t>
+                </a:r>
+                <a:r>
+                  <a:rPr lang="en-US" altLang="zh-CN" sz="2400" dirty="0" err="1" smtClean="0"/>
+                  <a:t>DryVR</a:t>
+                </a:r>
+                <a:r>
+                  <a:rPr lang="en-US" altLang="zh-CN" sz="2400" dirty="0" smtClean="0"/>
+                  <a:t> for the vehicle with initial condition </a:t>
+                </a:r>
+                <a14:m>
+                  <m:oMath xmlns:m="http://schemas.openxmlformats.org/officeDocument/2006/math">
+                    <m:r>
+                      <a:rPr lang="en-US" altLang="zh-CN" sz="2400" b="0" i="1" smtClean="0">
+                        <a:latin typeface="Cambria Math" panose="02040503050406030204" pitchFamily="18" charset="0"/>
+                      </a:rPr>
+                      <m:t>−15.05≤</m:t>
+                    </m:r>
+                    <m:r>
+                      <a:rPr lang="en-US" altLang="zh-CN" sz="2400" b="0" i="1" smtClean="0">
+                        <a:latin typeface="Cambria Math" panose="02040503050406030204" pitchFamily="18" charset="0"/>
+                      </a:rPr>
+                      <m:t>𝑥</m:t>
+                    </m:r>
+                    <m:r>
+                      <a:rPr lang="en-US" altLang="zh-CN" sz="2400" b="0" i="1" smtClean="0">
+                        <a:latin typeface="Cambria Math" panose="02040503050406030204" pitchFamily="18" charset="0"/>
+                      </a:rPr>
+                      <m:t>≤−14.05, −0.05≤</m:t>
+                    </m:r>
+                    <m:r>
+                      <a:rPr lang="en-US" altLang="zh-CN" sz="2400" b="0" i="1" smtClean="0">
+                        <a:latin typeface="Cambria Math" panose="02040503050406030204" pitchFamily="18" charset="0"/>
+                      </a:rPr>
+                      <m:t>𝑦</m:t>
+                    </m:r>
+                    <m:r>
+                      <a:rPr lang="en-US" altLang="zh-CN" sz="2400" b="0" i="1" smtClean="0">
+                        <a:latin typeface="Cambria Math" panose="02040503050406030204" pitchFamily="18" charset="0"/>
+                      </a:rPr>
+                      <m:t>≤0.05, −</m:t>
+                    </m:r>
+                    <m:r>
+                      <a:rPr lang="en-US" altLang="zh-CN" sz="2400" b="0" i="1" smtClean="0">
+                        <a:latin typeface="Cambria Math" panose="02040503050406030204" pitchFamily="18" charset="0"/>
+                      </a:rPr>
+                      <m:t>𝜋</m:t>
+                    </m:r>
+                    <m:r>
+                      <a:rPr lang="en-US" altLang="zh-CN" sz="2400" b="0" i="1" smtClean="0">
+                        <a:latin typeface="Cambria Math" panose="02040503050406030204" pitchFamily="18" charset="0"/>
+                      </a:rPr>
+                      <m:t>≤</m:t>
+                    </m:r>
+                    <m:r>
+                      <a:rPr lang="en-US" altLang="zh-CN" sz="2400" b="0" i="1" smtClean="0">
+                        <a:latin typeface="Cambria Math" panose="02040503050406030204" pitchFamily="18" charset="0"/>
+                      </a:rPr>
+                      <m:t>𝜃</m:t>
+                    </m:r>
+                    <m:r>
+                      <a:rPr lang="en-US" altLang="zh-CN" sz="2400" b="0" i="1" smtClean="0">
+                        <a:latin typeface="Cambria Math" panose="02040503050406030204" pitchFamily="18" charset="0"/>
+                      </a:rPr>
+                      <m:t>≤</m:t>
+                    </m:r>
+                    <m:r>
+                      <a:rPr lang="en-US" altLang="zh-CN" sz="2400" b="0" i="1" smtClean="0">
+                        <a:latin typeface="Cambria Math" panose="02040503050406030204" pitchFamily="18" charset="0"/>
+                      </a:rPr>
+                      <m:t>𝜋</m:t>
+                    </m:r>
+                  </m:oMath>
+                </a14:m>
+                <a:r>
+                  <a:rPr lang="en-US" altLang="zh-CN" sz="2400" dirty="0" smtClean="0"/>
+                  <a:t>, where x, y are the position of the vehicle and </a:t>
+                </a:r>
+                <a14:m>
+                  <m:oMath xmlns:m="http://schemas.openxmlformats.org/officeDocument/2006/math">
+                    <m:r>
+                      <a:rPr lang="en-US" altLang="zh-CN" sz="2400" b="0" i="1" smtClean="0">
+                        <a:latin typeface="Cambria Math" panose="02040503050406030204" pitchFamily="18" charset="0"/>
+                      </a:rPr>
+                      <m:t>𝜃</m:t>
+                    </m:r>
+                  </m:oMath>
+                </a14:m>
+                <a:r>
+                  <a:rPr lang="zh-CN" altLang="en-US" sz="2400" dirty="0" smtClean="0"/>
+                  <a:t> </a:t>
+                </a:r>
+                <a:r>
+                  <a:rPr lang="en-US" altLang="zh-CN" sz="2400" dirty="0" smtClean="0"/>
+                  <a:t>is the orientation of the vehicle.</a:t>
+                </a:r>
+              </a:p>
+              <a:p>
+                <a:pPr algn="just"/>
+                <a:endParaRPr lang="en-US" altLang="zh-CN" sz="2400" dirty="0"/>
+              </a:p>
+              <a:p>
+                <a:pPr algn="just"/>
+                <a:endParaRPr lang="en-US" altLang="zh-CN" sz="2400" dirty="0" smtClean="0"/>
+              </a:p>
+              <a:p>
+                <a:pPr algn="just"/>
+                <a:endParaRPr lang="en-US" altLang="zh-CN" sz="2400" dirty="0"/>
+              </a:p>
+              <a:p>
+                <a:pPr algn="just"/>
+                <a:endParaRPr lang="en-US" altLang="zh-CN" sz="2400" dirty="0" smtClean="0"/>
+              </a:p>
+              <a:p>
+                <a:pPr marL="0" indent="0" algn="just">
+                  <a:buNone/>
+                </a:pPr>
+                <a:endParaRPr lang="en-US" altLang="zh-CN" sz="2400" dirty="0" smtClean="0"/>
+              </a:p>
+              <a:p>
+                <a:pPr algn="just"/>
+                <a:endParaRPr lang="en-US" altLang="zh-CN" sz="2400" dirty="0"/>
+              </a:p>
+              <a:p>
+                <a:pPr algn="just"/>
+                <a:r>
+                  <a:rPr lang="en-US" altLang="zh-CN" sz="2400" dirty="0" smtClean="0"/>
+                  <a:t>In the pictures, the reach tube for mode 1 is not plotted since the vehicle will remain stationary in that mode. The red traces in the plot shows random simulation trajectories with the neural network tracking controller. </a:t>
+                </a:r>
+              </a:p>
+              <a:p>
+                <a:pPr algn="just"/>
+                <a:r>
+                  <a:rPr lang="en-US" altLang="zh-CN" sz="2400" dirty="0" smtClean="0"/>
+                  <a:t>The first plot plots time vs x. The second plot plots time vs y. The third plot plots x vs y.  </a:t>
+                </a:r>
+                <a:endParaRPr lang="en-US" altLang="zh-CN" sz="2400" dirty="0"/>
+              </a:p>
+            </p:txBody>
+          </p:sp>
+        </mc:Choice>
+        <mc:Fallback xmlns="">
+          <p:sp>
+            <p:nvSpPr>
+              <p:cNvPr id="2" name="文本占位符 1"/>
+              <p:cNvSpPr>
+                <a:spLocks noGrp="1" noRot="1" noChangeAspect="1" noMove="1" noResize="1" noEditPoints="1" noAdjustHandles="1" noChangeArrowheads="1" noChangeShapeType="1" noTextEdit="1"/>
+              </p:cNvSpPr>
+              <p:nvPr>
+                <p:ph type="body" sz="quarter" idx="12"/>
+              </p:nvPr>
+            </p:nvSpPr>
+            <p:spPr>
+              <a:xfrm>
+                <a:off x="610626" y="1633220"/>
+                <a:ext cx="12701026" cy="5380644"/>
+              </a:xfrm>
+              <a:blipFill rotWithShape="0">
+                <a:blip r:embed="rId2"/>
+                <a:stretch>
+                  <a:fillRect l="-624" t="-793" r="-720" b="-3624"/>
+                </a:stretch>
+              </a:blipFill>
+            </p:spPr>
+            <p:txBody>
+              <a:bodyPr/>
+              <a:lstStyle/>
+              <a:p>
+                <a:r>
+                  <a:rPr lang="zh-CN" altLang="en-US">
+                    <a:noFill/>
+                  </a:rPr>
+                  <a:t> </a:t>
+                </a:r>
+              </a:p>
+            </p:txBody>
+          </p:sp>
+        </mc:Fallback>
+      </mc:AlternateContent>
+      <p:sp>
+        <p:nvSpPr>
+          <p:cNvPr id="3" name="文本占位符 2"/>
+          <p:cNvSpPr>
+            <a:spLocks noGrp="1"/>
+          </p:cNvSpPr>
+          <p:nvPr>
+            <p:ph type="body" sz="quarter" idx="10"/>
+          </p:nvPr>
+        </p:nvSpPr>
+        <p:spPr/>
+        <p:txBody>
+          <a:bodyPr/>
+          <a:lstStyle/>
+          <a:p>
+            <a:r>
+              <a:rPr lang="en-US" altLang="zh-CN" dirty="0" smtClean="0"/>
+              <a:t>Computed </a:t>
+            </a:r>
+            <a:r>
+              <a:rPr lang="en-US" altLang="zh-CN" dirty="0" err="1" smtClean="0"/>
+              <a:t>Reachtube</a:t>
+            </a:r>
+            <a:r>
+              <a:rPr lang="en-US" altLang="zh-CN" dirty="0" smtClean="0"/>
+              <a:t>	</a:t>
+            </a:r>
+            <a:endParaRPr lang="zh-CN" altLang="en-US" dirty="0"/>
+          </a:p>
+        </p:txBody>
+      </p:sp>
+      <p:sp>
+        <p:nvSpPr>
+          <p:cNvPr id="4" name="灯片编号占位符 3"/>
+          <p:cNvSpPr>
+            <a:spLocks noGrp="1"/>
+          </p:cNvSpPr>
+          <p:nvPr>
+            <p:ph type="sldNum" sz="quarter" idx="4"/>
+          </p:nvPr>
+        </p:nvSpPr>
+        <p:spPr/>
+        <p:txBody>
+          <a:bodyPr/>
+          <a:lstStyle/>
+          <a:p>
+            <a:fld id="{7DAA0FC6-F71F-4650-BE21-9A15F164E712}" type="slidenum">
+              <a:rPr lang="en-US" smtClean="0"/>
+              <a:pPr/>
+              <a:t>10</a:t>
+            </a:fld>
+            <a:endParaRPr lang="en-US" dirty="0"/>
+          </a:p>
+        </p:txBody>
+      </p:sp>
+      <p:pic>
+        <p:nvPicPr>
+          <p:cNvPr id="5" name="图片 4"/>
+          <p:cNvPicPr>
+            <a:picLocks noChangeAspect="1"/>
+          </p:cNvPicPr>
+          <p:nvPr/>
+        </p:nvPicPr>
+        <p:blipFill>
+          <a:blip r:embed="rId3" cstate="print">
+            <a:extLst>
+              <a:ext uri="{28A0092B-C50C-407E-A947-70E740481C1C}">
+                <a14:useLocalDpi xmlns:a14="http://schemas.microsoft.com/office/drawing/2010/main" val="0"/>
+              </a:ext>
+            </a:extLst>
+          </a:blip>
+          <a:stretch>
+            <a:fillRect/>
+          </a:stretch>
+        </p:blipFill>
+        <p:spPr>
+          <a:xfrm>
+            <a:off x="1775078" y="2741771"/>
+            <a:ext cx="3489402" cy="2671893"/>
+          </a:xfrm>
+          <a:prstGeom prst="rect">
+            <a:avLst/>
+          </a:prstGeom>
+        </p:spPr>
+      </p:pic>
+      <p:pic>
+        <p:nvPicPr>
+          <p:cNvPr id="6" name="图片 5"/>
+          <p:cNvPicPr>
+            <a:picLocks noChangeAspect="1"/>
+          </p:cNvPicPr>
+          <p:nvPr/>
+        </p:nvPicPr>
+        <p:blipFill>
+          <a:blip r:embed="rId4" cstate="print">
+            <a:extLst>
+              <a:ext uri="{28A0092B-C50C-407E-A947-70E740481C1C}">
+                <a14:useLocalDpi xmlns:a14="http://schemas.microsoft.com/office/drawing/2010/main" val="0"/>
+              </a:ext>
+            </a:extLst>
+          </a:blip>
+          <a:stretch>
+            <a:fillRect/>
+          </a:stretch>
+        </p:blipFill>
+        <p:spPr>
+          <a:xfrm>
+            <a:off x="5264480" y="2741771"/>
+            <a:ext cx="3489402" cy="2671893"/>
+          </a:xfrm>
+          <a:prstGeom prst="rect">
+            <a:avLst/>
+          </a:prstGeom>
+        </p:spPr>
+      </p:pic>
+      <p:pic>
+        <p:nvPicPr>
+          <p:cNvPr id="7" name="图片 6"/>
+          <p:cNvPicPr>
+            <a:picLocks noChangeAspect="1"/>
+          </p:cNvPicPr>
+          <p:nvPr/>
+        </p:nvPicPr>
+        <p:blipFill>
+          <a:blip r:embed="rId5" cstate="print">
+            <a:extLst>
+              <a:ext uri="{28A0092B-C50C-407E-A947-70E740481C1C}">
+                <a14:useLocalDpi xmlns:a14="http://schemas.microsoft.com/office/drawing/2010/main" val="0"/>
+              </a:ext>
+            </a:extLst>
+          </a:blip>
+          <a:stretch>
+            <a:fillRect/>
+          </a:stretch>
+        </p:blipFill>
+        <p:spPr>
+          <a:xfrm>
+            <a:off x="8753882" y="2741771"/>
+            <a:ext cx="3489402" cy="2671893"/>
+          </a:xfrm>
+          <a:prstGeom prst="rect">
+            <a:avLst/>
+          </a:prstGeom>
+        </p:spPr>
+      </p:pic>
+    </p:spTree>
+    <p:extLst>
+      <p:ext uri="{BB962C8B-B14F-4D97-AF65-F5344CB8AC3E}">
+        <p14:creationId xmlns:p14="http://schemas.microsoft.com/office/powerpoint/2010/main" val="2556702610"/>
+      </p:ext>
+    </p:extLst>
+  </p:cSld>
+  <p:clrMapOvr>
+    <a:masterClrMapping/>
+  </p:clrMapOvr>
+</p:sld>
+</file>
+
+<file path=ppt/slides/slide11.xml><?xml version="1.0" encoding="utf-8"?>
+<p:sld xmlns:a="http://schemas.openxmlformats.org/drawingml/2006/main" xmlns:r="http://schemas.openxmlformats.org/officeDocument/2006/relationships" xmlns:p="http://schemas.openxmlformats.org/presentationml/2006/main">
+  <p:cSld>
+    <p:spTree>
+      <p:nvGrpSpPr>
+        <p:cNvPr id="1" name=""/>
+        <p:cNvGrpSpPr/>
+        <p:nvPr/>
+      </p:nvGrpSpPr>
+      <p:grpSpPr>
+        <a:xfrm>
+          <a:off x="0" y="0"/>
+          <a:ext cx="0" cy="0"/>
+          <a:chOff x="0" y="0"/>
+          <a:chExt cx="0" cy="0"/>
+        </a:xfrm>
+      </p:grpSpPr>
+      <p:sp>
+        <p:nvSpPr>
+          <p:cNvPr id="2" name="文本占位符 1"/>
+          <p:cNvSpPr>
+            <a:spLocks noGrp="1"/>
+          </p:cNvSpPr>
+          <p:nvPr>
+            <p:ph type="body" sz="quarter" idx="12"/>
+          </p:nvPr>
+        </p:nvSpPr>
+        <p:spPr/>
+        <p:txBody>
+          <a:bodyPr/>
+          <a:lstStyle/>
+          <a:p>
+            <a:pPr algn="just"/>
+            <a:r>
+              <a:rPr lang="en-US" altLang="zh-CN" sz="3200" dirty="0" smtClean="0"/>
+              <a:t>With the </a:t>
+            </a:r>
+            <a:r>
+              <a:rPr lang="en-US" altLang="zh-CN" sz="3200" dirty="0" err="1" smtClean="0"/>
+              <a:t>reachtube</a:t>
+            </a:r>
+            <a:r>
+              <a:rPr lang="en-US" altLang="zh-CN" sz="3200" dirty="0" smtClean="0"/>
+              <a:t> computed, it is possible to obtain a bound for the error of tracking the reference trajectory. </a:t>
+            </a:r>
+          </a:p>
+          <a:p>
+            <a:pPr algn="just"/>
+            <a:endParaRPr lang="en-US" altLang="zh-CN" sz="3200" dirty="0"/>
+          </a:p>
+          <a:p>
+            <a:pPr algn="just"/>
+            <a:r>
+              <a:rPr lang="en-US" altLang="zh-CN" sz="3200" dirty="0" smtClean="0"/>
+              <a:t>The next step is to generate a reference trajectory that the vehicle can follow and can reach the goal. </a:t>
+            </a:r>
+          </a:p>
+        </p:txBody>
+      </p:sp>
+      <p:sp>
+        <p:nvSpPr>
+          <p:cNvPr id="3" name="文本占位符 2"/>
+          <p:cNvSpPr>
+            <a:spLocks noGrp="1"/>
+          </p:cNvSpPr>
+          <p:nvPr>
+            <p:ph type="body" sz="quarter" idx="10"/>
+          </p:nvPr>
+        </p:nvSpPr>
+        <p:spPr/>
+        <p:txBody>
+          <a:bodyPr/>
+          <a:lstStyle/>
+          <a:p>
+            <a:r>
+              <a:rPr lang="en-US" altLang="zh-CN" dirty="0" smtClean="0"/>
+              <a:t>Next Step	</a:t>
+            </a:r>
+            <a:endParaRPr lang="zh-CN" altLang="en-US" dirty="0"/>
+          </a:p>
+        </p:txBody>
+      </p:sp>
+      <p:sp>
+        <p:nvSpPr>
+          <p:cNvPr id="4" name="灯片编号占位符 3"/>
+          <p:cNvSpPr>
+            <a:spLocks noGrp="1"/>
+          </p:cNvSpPr>
+          <p:nvPr>
+            <p:ph type="sldNum" sz="quarter" idx="4"/>
+          </p:nvPr>
+        </p:nvSpPr>
+        <p:spPr/>
+        <p:txBody>
+          <a:bodyPr/>
+          <a:lstStyle/>
+          <a:p>
+            <a:fld id="{7DAA0FC6-F71F-4650-BE21-9A15F164E712}" type="slidenum">
+              <a:rPr lang="en-US" smtClean="0"/>
+              <a:pPr/>
+              <a:t>11</a:t>
+            </a:fld>
+            <a:endParaRPr lang="en-US" dirty="0"/>
+          </a:p>
+        </p:txBody>
+      </p:sp>
+    </p:spTree>
+    <p:extLst>
+      <p:ext uri="{BB962C8B-B14F-4D97-AF65-F5344CB8AC3E}">
+        <p14:creationId xmlns:p14="http://schemas.microsoft.com/office/powerpoint/2010/main" val="1400447984"/>
+      </p:ext>
+    </p:extLst>
+  </p:cSld>
+  <p:clrMapOvr>
+    <a:masterClrMapping/>
+  </p:clrMapOvr>
+</p:sld>
+</file>
+
 <file path=ppt/slides/slide2.xml><?xml version="1.0" encoding="utf-8"?>
 <p:sld xmlns:a="http://schemas.openxmlformats.org/drawingml/2006/main" xmlns:r="http://schemas.openxmlformats.org/officeDocument/2006/relationships" xmlns:p="http://schemas.openxmlformats.org/presentationml/2006/main">
   <p:cSld>
@@ -3808,43 +4213,46 @@
             <p:ph type="body" sz="quarter" idx="12"/>
           </p:nvPr>
         </p:nvSpPr>
-        <p:spPr/>
+        <p:spPr>
+          <a:xfrm>
+            <a:off x="610626" y="1633220"/>
+            <a:ext cx="12701026" cy="4435071"/>
+          </a:xfrm>
+        </p:spPr>
         <p:txBody>
           <a:bodyPr/>
           <a:lstStyle/>
           <a:p>
+            <a:r>
+              <a:rPr lang="en-US" altLang="zh-CN" dirty="0" smtClean="0"/>
+              <a:t>The controller we have is trying to track a given reference trajectory.</a:t>
+            </a:r>
+          </a:p>
+          <a:p>
+            <a:endParaRPr lang="en-US" altLang="zh-CN" dirty="0"/>
+          </a:p>
+          <a:p>
             <a:pPr algn="just"/>
             <a:r>
-              <a:rPr lang="en-US" altLang="zh-CN" sz="3200" dirty="0" smtClean="0"/>
-              <a:t>The tracking controller should drive the vehicle to track a reference trajectory.</a:t>
+              <a:rPr lang="en-US" altLang="zh-CN" sz="3600" dirty="0"/>
+              <a:t>The reference trajectory is a straight line connecting the initial position of the vehicle and a point 15 unit away from the initial position of the vehicle. </a:t>
             </a:r>
+            <a:endParaRPr lang="en-US" altLang="zh-CN" sz="3600" dirty="0" smtClean="0"/>
           </a:p>
           <a:p>
             <a:pPr algn="just"/>
-            <a:endParaRPr lang="en-US" altLang="zh-CN" sz="3200" dirty="0"/>
+            <a:endParaRPr lang="en-US" altLang="zh-CN" sz="3600" dirty="0"/>
           </a:p>
           <a:p>
             <a:pPr algn="just"/>
             <a:r>
-              <a:rPr lang="en-US" altLang="zh-CN" sz="3200" dirty="0" smtClean="0"/>
-              <a:t>In the current setting, the tracking controller can drive the vehicle to a waypoint 15 units away from its initial position regardless of its initial orientation. </a:t>
+              <a:rPr lang="en-US" altLang="zh-CN" sz="3600" dirty="0"/>
+              <a:t>The reference trajectory is constructed by assuming the vehicle is running at constant velocity 5. </a:t>
             </a:r>
-            <a:endParaRPr lang="en-US" altLang="zh-CN" sz="3200" dirty="0"/>
-          </a:p>
-          <a:p>
-            <a:pPr indent="0">
-              <a:spcBef>
-                <a:spcPts val="2133"/>
-              </a:spcBef>
-              <a:spcAft>
-                <a:spcPts val="2133"/>
-              </a:spcAft>
-              <a:buNone/>
-            </a:pPr>
-            <a:endParaRPr lang="en-US" altLang="zh-CN" sz="3200" dirty="0"/>
-          </a:p>
-          <a:p>
-            <a:endParaRPr lang="zh-CN" altLang="en-US" sz="3200" dirty="0"/>
+          </a:p>
+          <a:p>
+            <a:pPr algn="just"/>
+            <a:endParaRPr lang="en-US" altLang="zh-CN" sz="3600" dirty="0"/>
           </a:p>
         </p:txBody>
       </p:sp>
@@ -3865,7 +4273,7 @@
           <a:p>
             <a:r>
               <a:rPr lang="en-US" altLang="zh-CN" dirty="0" smtClean="0"/>
-              <a:t>Tracking Controller</a:t>
+              <a:t>Reference Trajectory	</a:t>
             </a:r>
             <a:endParaRPr lang="zh-CN" altLang="en-US" dirty="0"/>
           </a:p>
@@ -3898,7 +4306,7 @@
     </p:spTree>
     <p:extLst>
       <p:ext uri="{BB962C8B-B14F-4D97-AF65-F5344CB8AC3E}">
-        <p14:creationId xmlns:p14="http://schemas.microsoft.com/office/powerpoint/2010/main" val="3917600048"/>
+        <p14:creationId xmlns:p14="http://schemas.microsoft.com/office/powerpoint/2010/main" val="698137626"/>
       </p:ext>
     </p:extLst>
   </p:cSld>
@@ -3942,108 +4350,755 @@
               <a:bodyPr/>
               <a:lstStyle/>
               <a:p>
-                <a:pPr algn="just"/>
+                <a:r>
+                  <a:rPr lang="en-US" altLang="zh-CN" sz="2800" dirty="0"/>
+                  <a:t>The tracking controller should drive the vehicle to track a reference trajectory</a:t>
+                </a:r>
+                <a:r>
+                  <a:rPr lang="en-US" altLang="zh-CN" sz="2800" dirty="0" smtClean="0"/>
+                  <a:t>.</a:t>
+                </a:r>
+                <a:endParaRPr lang="en-US" altLang="zh-CN" sz="2800" dirty="0" smtClean="0"/>
+              </a:p>
+              <a:p>
+                <a:r>
+                  <a:rPr lang="en-US" altLang="zh-CN" sz="2800" dirty="0" smtClean="0"/>
+                  <a:t>The Whole system </a:t>
+                </a:r>
+                <a:r>
+                  <a:rPr lang="en-US" altLang="zh-CN" sz="2800" dirty="0" smtClean="0"/>
+                  <a:t>is defined by using difference equation. </a:t>
+                </a:r>
+                <a:endParaRPr lang="en-US" altLang="zh-CN" sz="2800" dirty="0" smtClean="0"/>
+              </a:p>
+              <a:p>
+                <a:pPr lvl="1"/>
                 <a:r>
                   <a:rPr lang="en-US" altLang="zh-CN" sz="2400" dirty="0" smtClean="0"/>
-                  <a:t>In the current setting, the tracking controller can drive the vehicle to a waypoint 15 unit away from its initial position regardless of its initial orientation. </a:t>
+                  <a:t>x(t+1) = x(t) + </a:t>
                 </a:r>
-              </a:p>
-              <a:p>
-                <a:pPr algn="just"/>
-                <a:endParaRPr lang="en-US" altLang="zh-CN" sz="2400" dirty="0"/>
-              </a:p>
-              <a:p>
-                <a:pPr algn="just"/>
+                <a14:m>
+                  <m:oMath xmlns:m="http://schemas.openxmlformats.org/officeDocument/2006/math">
+                    <m:sSub>
+                      <m:sSubPr>
+                        <m:ctrlPr>
+                          <a:rPr lang="en-US" altLang="zh-CN" sz="2400" b="0" i="1" smtClean="0">
+                            <a:latin typeface="Cambria Math" panose="02040503050406030204" pitchFamily="18" charset="0"/>
+                          </a:rPr>
+                        </m:ctrlPr>
+                      </m:sSubPr>
+                      <m:e>
+                        <m:r>
+                          <a:rPr lang="en-US" altLang="zh-CN" sz="2400" b="0" i="1" smtClean="0">
+                            <a:latin typeface="Cambria Math" panose="02040503050406030204" pitchFamily="18" charset="0"/>
+                          </a:rPr>
+                          <m:t>𝛿</m:t>
+                        </m:r>
+                      </m:e>
+                      <m:sub>
+                        <m:r>
+                          <a:rPr lang="en-US" altLang="zh-CN" sz="2400" b="0" i="1" smtClean="0">
+                            <a:latin typeface="Cambria Math" panose="02040503050406030204" pitchFamily="18" charset="0"/>
+                          </a:rPr>
+                          <m:t>𝑡</m:t>
+                        </m:r>
+                      </m:sub>
+                    </m:sSub>
+                    <m:r>
+                      <a:rPr lang="en-US" altLang="zh-CN" sz="2400" b="0" i="1" smtClean="0">
+                        <a:latin typeface="Cambria Math" panose="02040503050406030204" pitchFamily="18" charset="0"/>
+                      </a:rPr>
+                      <m:t>∗</m:t>
+                    </m:r>
+                    <m:r>
+                      <a:rPr lang="en-US" altLang="zh-CN" sz="2400" b="0" i="1" smtClean="0">
+                        <a:latin typeface="Cambria Math" panose="02040503050406030204" pitchFamily="18" charset="0"/>
+                      </a:rPr>
+                      <m:t>𝑓</m:t>
+                    </m:r>
+                    <m:r>
+                      <a:rPr lang="en-US" altLang="zh-CN" sz="2400" b="0" i="1" smtClean="0">
+                        <a:latin typeface="Cambria Math" panose="02040503050406030204" pitchFamily="18" charset="0"/>
+                      </a:rPr>
+                      <m:t>(</m:t>
+                    </m:r>
+                    <m:r>
+                      <a:rPr lang="en-US" altLang="zh-CN" sz="2400" b="0" i="1" smtClean="0">
+                        <a:latin typeface="Cambria Math" panose="02040503050406030204" pitchFamily="18" charset="0"/>
+                      </a:rPr>
+                      <m:t>𝑥</m:t>
+                    </m:r>
+                    <m:r>
+                      <a:rPr lang="en-US" altLang="zh-CN" sz="2400" b="0" i="1" smtClean="0">
+                        <a:latin typeface="Cambria Math" panose="02040503050406030204" pitchFamily="18" charset="0"/>
+                      </a:rPr>
+                      <m:t>(</m:t>
+                    </m:r>
+                    <m:r>
+                      <a:rPr lang="en-US" altLang="zh-CN" sz="2400" b="0" i="1" smtClean="0">
+                        <a:latin typeface="Cambria Math" panose="02040503050406030204" pitchFamily="18" charset="0"/>
+                      </a:rPr>
+                      <m:t>𝑡</m:t>
+                    </m:r>
+                    <m:r>
+                      <a:rPr lang="en-US" altLang="zh-CN" sz="2400" b="0" i="1" smtClean="0">
+                        <a:latin typeface="Cambria Math" panose="02040503050406030204" pitchFamily="18" charset="0"/>
+                      </a:rPr>
+                      <m:t>),</m:t>
+                    </m:r>
+                    <m:r>
+                      <a:rPr lang="en-US" altLang="zh-CN" sz="2400" b="0" i="1" smtClean="0">
+                        <a:latin typeface="Cambria Math" panose="02040503050406030204" pitchFamily="18" charset="0"/>
+                      </a:rPr>
+                      <m:t>𝑢</m:t>
+                    </m:r>
+                    <m:r>
+                      <a:rPr lang="en-US" altLang="zh-CN" sz="2400" b="0" i="1" smtClean="0">
+                        <a:latin typeface="Cambria Math" panose="02040503050406030204" pitchFamily="18" charset="0"/>
+                      </a:rPr>
+                      <m:t>(</m:t>
+                    </m:r>
+                    <m:r>
+                      <a:rPr lang="en-US" altLang="zh-CN" sz="2400" b="0" i="1" smtClean="0">
+                        <a:latin typeface="Cambria Math" panose="02040503050406030204" pitchFamily="18" charset="0"/>
+                      </a:rPr>
+                      <m:t>𝑡</m:t>
+                    </m:r>
+                    <m:r>
+                      <a:rPr lang="en-US" altLang="zh-CN" sz="2400" b="0" i="1" smtClean="0">
+                        <a:latin typeface="Cambria Math" panose="02040503050406030204" pitchFamily="18" charset="0"/>
+                      </a:rPr>
+                      <m:t>))</m:t>
+                    </m:r>
+                  </m:oMath>
+                </a14:m>
                 <a:r>
                   <a:rPr lang="en-US" altLang="zh-CN" sz="2400" dirty="0" smtClean="0"/>
-                  <a:t>The input to the tracking controller is </a:t>
-                </a:r>
-              </a:p>
-              <a:p>
-                <a:pPr lvl="1" algn="just"/>
-                <a:r>
-                  <a:rPr lang="en-US" altLang="zh-CN" sz="2000" dirty="0"/>
-                  <a:t>T</a:t>
-                </a:r>
-                <a:r>
-                  <a:rPr lang="en-US" altLang="zh-CN" sz="2000" dirty="0" smtClean="0"/>
-                  <a:t>he distance </a:t>
+                  <a:t>,</a:t>
                 </a:r>
                 <a14:m>
                   <m:oMath xmlns:m="http://schemas.openxmlformats.org/officeDocument/2006/math">
                     <m:r>
-                      <m:rPr>
-                        <m:sty m:val="p"/>
-                      </m:rPr>
-                      <a:rPr lang="en-US" altLang="zh-CN" sz="2000" b="0" i="0" smtClean="0">
+                      <a:rPr lang="en-US" altLang="zh-CN" sz="2400" b="0" i="1" dirty="0" smtClean="0">
                         <a:latin typeface="Cambria Math" panose="02040503050406030204" pitchFamily="18" charset="0"/>
                       </a:rPr>
-                      <m:t>Δ</m:t>
+                      <m:t>𝑓</m:t>
                     </m:r>
                     <m:r>
-                      <a:rPr lang="en-US" altLang="zh-CN" sz="2000" b="0" i="1" smtClean="0">
+                      <a:rPr lang="en-US" altLang="zh-CN" sz="2400" b="0" i="1" dirty="0" smtClean="0">
                         <a:latin typeface="Cambria Math" panose="02040503050406030204" pitchFamily="18" charset="0"/>
                       </a:rPr>
-                      <m:t>𝑝</m:t>
+                      <m:t>(</m:t>
+                    </m:r>
+                    <m:r>
+                      <a:rPr lang="en-US" altLang="zh-CN" sz="2400" b="0" i="1" dirty="0" smtClean="0">
+                        <a:latin typeface="Cambria Math" panose="02040503050406030204" pitchFamily="18" charset="0"/>
+                      </a:rPr>
+                      <m:t>𝑥</m:t>
+                    </m:r>
+                    <m:d>
+                      <m:dPr>
+                        <m:ctrlPr>
+                          <a:rPr lang="en-US" altLang="zh-CN" sz="2400" b="0" i="1" dirty="0" smtClean="0">
+                            <a:latin typeface="Cambria Math" panose="02040503050406030204" pitchFamily="18" charset="0"/>
+                          </a:rPr>
+                        </m:ctrlPr>
+                      </m:dPr>
+                      <m:e>
+                        <m:r>
+                          <a:rPr lang="en-US" altLang="zh-CN" sz="2400" b="0" i="1" dirty="0" smtClean="0">
+                            <a:latin typeface="Cambria Math" panose="02040503050406030204" pitchFamily="18" charset="0"/>
+                          </a:rPr>
+                          <m:t>𝑡</m:t>
+                        </m:r>
+                      </m:e>
+                    </m:d>
+                    <m:r>
+                      <a:rPr lang="en-US" altLang="zh-CN" sz="2400" b="0" i="1" dirty="0" smtClean="0">
+                        <a:latin typeface="Cambria Math" panose="02040503050406030204" pitchFamily="18" charset="0"/>
+                      </a:rPr>
+                      <m:t>,</m:t>
+                    </m:r>
+                    <m:r>
+                      <a:rPr lang="en-US" altLang="zh-CN" sz="2400" b="0" i="1" dirty="0" smtClean="0">
+                        <a:latin typeface="Cambria Math" panose="02040503050406030204" pitchFamily="18" charset="0"/>
+                      </a:rPr>
+                      <m:t>𝑢</m:t>
+                    </m:r>
+                    <m:r>
+                      <a:rPr lang="en-US" altLang="zh-CN" sz="2400" b="0" i="1" dirty="0" smtClean="0">
+                        <a:latin typeface="Cambria Math" panose="02040503050406030204" pitchFamily="18" charset="0"/>
+                      </a:rPr>
+                      <m:t>(</m:t>
+                    </m:r>
+                    <m:r>
+                      <a:rPr lang="en-US" altLang="zh-CN" sz="2400" b="0" i="1" dirty="0" smtClean="0">
+                        <a:latin typeface="Cambria Math" panose="02040503050406030204" pitchFamily="18" charset="0"/>
+                      </a:rPr>
+                      <m:t>𝑡</m:t>
+                    </m:r>
+                    <m:r>
+                      <a:rPr lang="en-US" altLang="zh-CN" sz="2400" b="0" i="1" dirty="0" smtClean="0">
+                        <a:latin typeface="Cambria Math" panose="02040503050406030204" pitchFamily="18" charset="0"/>
+                      </a:rPr>
+                      <m:t>))</m:t>
                     </m:r>
                   </m:oMath>
                 </a14:m>
                 <a:r>
-                  <a:rPr lang="en-US" altLang="zh-CN" sz="2000" dirty="0" smtClean="0"/>
-                  <a:t> between the current position of the vehicle and the reference waypoint</a:t>
+                  <a:rPr lang="en-US" altLang="zh-CN" sz="2400" dirty="0" smtClean="0"/>
+                  <a:t> is given by the dynamics of the model</a:t>
                 </a:r>
               </a:p>
               <a:p>
-                <a:pPr lvl="1" algn="just"/>
                 <a:r>
-                  <a:rPr lang="en-US" altLang="zh-CN" sz="2000" dirty="0" smtClean="0"/>
-                  <a:t>The angle </a:t>
+                  <a:rPr lang="en-US" altLang="zh-CN" sz="2800" dirty="0" smtClean="0"/>
+                  <a:t>The input to the system is defined by</a:t>
                 </a:r>
+                <a:endParaRPr lang="en-US" altLang="zh-CN" sz="2800" dirty="0" smtClean="0"/>
+              </a:p>
+              <a:p>
+                <a:pPr lvl="1"/>
                 <a14:m>
                   <m:oMath xmlns:m="http://schemas.openxmlformats.org/officeDocument/2006/math">
                     <m:r>
-                      <m:rPr>
-                        <m:sty m:val="p"/>
-                      </m:rPr>
-                      <a:rPr lang="en-US" altLang="zh-CN" sz="2000" b="0" i="0" smtClean="0">
+                      <a:rPr lang="en-US" altLang="zh-CN" sz="2400" i="1" dirty="0" smtClean="0">
                         <a:latin typeface="Cambria Math" panose="02040503050406030204" pitchFamily="18" charset="0"/>
                       </a:rPr>
-                      <m:t>Δ</m:t>
+                      <m:t>𝑢</m:t>
                     </m:r>
                     <m:r>
-                      <a:rPr lang="en-US" altLang="zh-CN" sz="2000" b="0" i="1" smtClean="0">
+                      <a:rPr lang="en-US" altLang="zh-CN" sz="2400" i="1" dirty="0" smtClean="0">
                         <a:latin typeface="Cambria Math" panose="02040503050406030204" pitchFamily="18" charset="0"/>
                       </a:rPr>
-                      <m:t>𝜃</m:t>
+                      <m:t>(</m:t>
+                    </m:r>
+                    <m:r>
+                      <a:rPr lang="en-US" altLang="zh-CN" sz="2400" i="1" dirty="0" smtClean="0">
+                        <a:latin typeface="Cambria Math" panose="02040503050406030204" pitchFamily="18" charset="0"/>
+                      </a:rPr>
+                      <m:t>𝑡</m:t>
+                    </m:r>
+                    <m:r>
+                      <a:rPr lang="en-US" altLang="zh-CN" sz="2400" i="1" dirty="0" smtClean="0">
+                        <a:latin typeface="Cambria Math" panose="02040503050406030204" pitchFamily="18" charset="0"/>
+                      </a:rPr>
+                      <m:t>) = </m:t>
+                    </m:r>
+                    <m:r>
+                      <a:rPr lang="en-US" altLang="zh-CN" sz="2400" i="1" dirty="0" smtClean="0">
+                        <a:latin typeface="Cambria Math" panose="02040503050406030204" pitchFamily="18" charset="0"/>
+                      </a:rPr>
+                      <m:t>𝑔</m:t>
+                    </m:r>
+                    <m:r>
+                      <a:rPr lang="en-US" altLang="zh-CN" sz="2400" i="1" dirty="0" smtClean="0">
+                        <a:latin typeface="Cambria Math" panose="02040503050406030204" pitchFamily="18" charset="0"/>
+                      </a:rPr>
+                      <m:t>(</m:t>
+                    </m:r>
+                    <m:r>
+                      <a:rPr lang="en-US" altLang="zh-CN" sz="2400" b="0" i="1" dirty="0" smtClean="0">
+                        <a:latin typeface="Cambria Math" panose="02040503050406030204" pitchFamily="18" charset="0"/>
+                      </a:rPr>
+                      <m:t>𝑒𝑟𝑟𝑜𝑟</m:t>
+                    </m:r>
+                    <m:r>
+                      <a:rPr lang="en-US" altLang="zh-CN" sz="2400" b="0" i="1" dirty="0" smtClean="0">
+                        <a:latin typeface="Cambria Math" panose="02040503050406030204" pitchFamily="18" charset="0"/>
+                      </a:rPr>
+                      <m:t>(</m:t>
+                    </m:r>
+                    <m:r>
+                      <a:rPr lang="en-US" altLang="zh-CN" sz="2400" b="0" i="1" dirty="0" smtClean="0">
+                        <a:latin typeface="Cambria Math" panose="02040503050406030204" pitchFamily="18" charset="0"/>
+                      </a:rPr>
+                      <m:t>𝑡</m:t>
+                    </m:r>
+                    <m:r>
+                      <a:rPr lang="en-US" altLang="zh-CN" sz="2400" b="0" i="1" dirty="0" smtClean="0">
+                        <a:latin typeface="Cambria Math" panose="02040503050406030204" pitchFamily="18" charset="0"/>
+                      </a:rPr>
+                      <m:t>)</m:t>
+                    </m:r>
+                    <m:r>
+                      <a:rPr lang="en-US" altLang="zh-CN" sz="2400" b="0" i="0" dirty="0" smtClean="0">
+                        <a:latin typeface="Cambria Math" panose="02040503050406030204" pitchFamily="18" charset="0"/>
+                      </a:rPr>
+                      <m:t>)</m:t>
                     </m:r>
                   </m:oMath>
                 </a14:m>
                 <a:r>
-                  <a:rPr lang="en-US" altLang="zh-CN" sz="2000" dirty="0" smtClean="0"/>
-                  <a:t> between the orientation of the vehicle and the line segment connecting the vehicle and reference waypoint.</a:t>
+                  <a:rPr lang="en-US" altLang="zh-CN" sz="2400" dirty="0" smtClean="0"/>
+                  <a:t>, where function g is represented by the neural network. </a:t>
                 </a:r>
               </a:p>
               <a:p>
-                <a:pPr lvl="1" algn="just"/>
                 <a:r>
-                  <a:rPr lang="en-US" altLang="zh-CN" sz="2000" dirty="0" smtClean="0"/>
-                  <a:t>The problem is by construction translation and rotation invariant. </a:t>
+                  <a:rPr lang="en-US" altLang="zh-CN" sz="2800" dirty="0" smtClean="0"/>
+                  <a:t>The input to the neural network is the error between reference trajectory and actual state defined as </a:t>
                 </a:r>
+                <a:endParaRPr lang="en-US" altLang="zh-CN" sz="2800" dirty="0" smtClean="0"/>
               </a:p>
               <a:p>
-                <a:pPr indent="0">
-                  <a:spcBef>
-                    <a:spcPts val="2133"/>
-                  </a:spcBef>
-                  <a:spcAft>
-                    <a:spcPts val="2133"/>
-                  </a:spcAft>
-                  <a:buNone/>
-                </a:pPr>
-                <a:endParaRPr lang="en-US" altLang="zh-CN" sz="3200" dirty="0"/>
-              </a:p>
-              <a:p>
-                <a:endParaRPr lang="zh-CN" altLang="en-US" sz="3200" dirty="0"/>
+                <a:pPr lvl="1"/>
+                <a14:m>
+                  <m:oMath xmlns:m="http://schemas.openxmlformats.org/officeDocument/2006/math">
+                    <m:r>
+                      <a:rPr lang="en-US" altLang="zh-CN" sz="2400" b="0" i="1" smtClean="0">
+                        <a:latin typeface="Cambria Math" panose="02040503050406030204" pitchFamily="18" charset="0"/>
+                      </a:rPr>
+                      <m:t>𝑒𝑟𝑟𝑜𝑟</m:t>
+                    </m:r>
+                    <m:d>
+                      <m:dPr>
+                        <m:ctrlPr>
+                          <a:rPr lang="en-US" altLang="zh-CN" sz="2400" b="0" i="1" smtClean="0">
+                            <a:latin typeface="Cambria Math" panose="02040503050406030204" pitchFamily="18" charset="0"/>
+                          </a:rPr>
+                        </m:ctrlPr>
+                      </m:dPr>
+                      <m:e>
+                        <m:r>
+                          <a:rPr lang="en-US" altLang="zh-CN" sz="2400" b="0" i="1" smtClean="0">
+                            <a:latin typeface="Cambria Math" panose="02040503050406030204" pitchFamily="18" charset="0"/>
+                          </a:rPr>
+                          <m:t>𝑡</m:t>
+                        </m:r>
+                      </m:e>
+                    </m:d>
+                    <m:r>
+                      <a:rPr lang="en-US" altLang="zh-CN" sz="2400" b="0" i="1" smtClean="0">
+                        <a:latin typeface="Cambria Math" panose="02040503050406030204" pitchFamily="18" charset="0"/>
+                      </a:rPr>
+                      <m:t>=[</m:t>
+                    </m:r>
+                    <m:sSub>
+                      <m:sSubPr>
+                        <m:ctrlPr>
+                          <a:rPr lang="en-US" altLang="zh-CN" sz="2400" b="0" i="1" smtClean="0">
+                            <a:latin typeface="Cambria Math" panose="02040503050406030204" pitchFamily="18" charset="0"/>
+                          </a:rPr>
+                        </m:ctrlPr>
+                      </m:sSubPr>
+                      <m:e>
+                        <m:r>
+                          <a:rPr lang="en-US" altLang="zh-CN" sz="2400" b="0" i="1" smtClean="0">
+                            <a:latin typeface="Cambria Math" panose="02040503050406030204" pitchFamily="18" charset="0"/>
+                          </a:rPr>
+                          <m:t>𝑥</m:t>
+                        </m:r>
+                      </m:e>
+                      <m:sub>
+                        <m:r>
+                          <a:rPr lang="en-US" altLang="zh-CN" sz="2400" b="0" i="1" smtClean="0">
+                            <a:latin typeface="Cambria Math" panose="02040503050406030204" pitchFamily="18" charset="0"/>
+                          </a:rPr>
+                          <m:t>𝑟𝑒𝑓</m:t>
+                        </m:r>
+                      </m:sub>
+                    </m:sSub>
+                    <m:d>
+                      <m:dPr>
+                        <m:ctrlPr>
+                          <a:rPr lang="en-US" altLang="zh-CN" sz="2400" b="0" i="1" smtClean="0">
+                            <a:latin typeface="Cambria Math" panose="02040503050406030204" pitchFamily="18" charset="0"/>
+                          </a:rPr>
+                        </m:ctrlPr>
+                      </m:dPr>
+                      <m:e>
+                        <m:r>
+                          <a:rPr lang="en-US" altLang="zh-CN" sz="2400" b="0" i="1" smtClean="0">
+                            <a:latin typeface="Cambria Math" panose="02040503050406030204" pitchFamily="18" charset="0"/>
+                          </a:rPr>
+                          <m:t>𝑡</m:t>
+                        </m:r>
+                        <m:r>
+                          <a:rPr lang="en-US" altLang="zh-CN" sz="2400" b="0" i="1" smtClean="0">
+                            <a:latin typeface="Cambria Math" panose="02040503050406030204" pitchFamily="18" charset="0"/>
+                          </a:rPr>
+                          <m:t>+1</m:t>
+                        </m:r>
+                      </m:e>
+                    </m:d>
+                    <m:r>
+                      <a:rPr lang="en-US" altLang="zh-CN" sz="2400" b="0" i="1" smtClean="0">
+                        <a:latin typeface="Cambria Math" panose="02040503050406030204" pitchFamily="18" charset="0"/>
+                      </a:rPr>
+                      <m:t>−</m:t>
+                    </m:r>
+                    <m:r>
+                      <a:rPr lang="en-US" altLang="zh-CN" sz="2400" b="0" i="1" smtClean="0">
+                        <a:latin typeface="Cambria Math" panose="02040503050406030204" pitchFamily="18" charset="0"/>
+                      </a:rPr>
+                      <m:t>𝑥</m:t>
+                    </m:r>
+                    <m:d>
+                      <m:dPr>
+                        <m:ctrlPr>
+                          <a:rPr lang="en-US" altLang="zh-CN" sz="2400" b="0" i="1" smtClean="0">
+                            <a:latin typeface="Cambria Math" panose="02040503050406030204" pitchFamily="18" charset="0"/>
+                          </a:rPr>
+                        </m:ctrlPr>
+                      </m:dPr>
+                      <m:e>
+                        <m:r>
+                          <a:rPr lang="en-US" altLang="zh-CN" sz="2400" b="0" i="1" smtClean="0">
+                            <a:latin typeface="Cambria Math" panose="02040503050406030204" pitchFamily="18" charset="0"/>
+                          </a:rPr>
+                          <m:t>𝑡</m:t>
+                        </m:r>
+                      </m:e>
+                    </m:d>
+                    <m:r>
+                      <a:rPr lang="en-US" altLang="zh-CN" sz="2400" b="0" i="1" smtClean="0">
+                        <a:latin typeface="Cambria Math" panose="02040503050406030204" pitchFamily="18" charset="0"/>
+                      </a:rPr>
+                      <m:t>, </m:t>
+                    </m:r>
+                    <m:func>
+                      <m:funcPr>
+                        <m:ctrlPr>
+                          <a:rPr lang="en-US" altLang="zh-CN" sz="2400" b="0" i="1" smtClean="0">
+                            <a:latin typeface="Cambria Math" panose="02040503050406030204" pitchFamily="18" charset="0"/>
+                          </a:rPr>
+                        </m:ctrlPr>
+                      </m:funcPr>
+                      <m:fName>
+                        <m:r>
+                          <a:rPr lang="en-US" altLang="zh-CN" sz="2400" i="1">
+                            <a:latin typeface="Cambria Math" panose="02040503050406030204" pitchFamily="18" charset="0"/>
+                          </a:rPr>
+                          <m:t>𝑎𝑏𝑠</m:t>
+                        </m:r>
+                        <m:r>
+                          <a:rPr lang="en-US" altLang="zh-CN" sz="2400" i="1">
+                            <a:latin typeface="Cambria Math" panose="02040503050406030204" pitchFamily="18" charset="0"/>
+                          </a:rPr>
+                          <m:t>(</m:t>
+                        </m:r>
+                        <m:sSub>
+                          <m:sSubPr>
+                            <m:ctrlPr>
+                              <a:rPr lang="en-US" altLang="zh-CN" sz="2400" i="1">
+                                <a:latin typeface="Cambria Math" panose="02040503050406030204" pitchFamily="18" charset="0"/>
+                              </a:rPr>
+                            </m:ctrlPr>
+                          </m:sSubPr>
+                          <m:e>
+                            <m:r>
+                              <a:rPr lang="en-US" altLang="zh-CN" sz="2400" i="1">
+                                <a:latin typeface="Cambria Math" panose="02040503050406030204" pitchFamily="18" charset="0"/>
+                              </a:rPr>
+                              <m:t>𝑦</m:t>
+                            </m:r>
+                          </m:e>
+                          <m:sub>
+                            <m:r>
+                              <a:rPr lang="en-US" altLang="zh-CN" sz="2400" i="1">
+                                <a:latin typeface="Cambria Math" panose="02040503050406030204" pitchFamily="18" charset="0"/>
+                              </a:rPr>
+                              <m:t>𝑟𝑒𝑓</m:t>
+                            </m:r>
+                          </m:sub>
+                        </m:sSub>
+                        <m:d>
+                          <m:dPr>
+                            <m:ctrlPr>
+                              <a:rPr lang="en-US" altLang="zh-CN" sz="2400" i="1">
+                                <a:latin typeface="Cambria Math" panose="02040503050406030204" pitchFamily="18" charset="0"/>
+                              </a:rPr>
+                            </m:ctrlPr>
+                          </m:dPr>
+                          <m:e>
+                            <m:r>
+                              <a:rPr lang="en-US" altLang="zh-CN" sz="2400" i="1">
+                                <a:latin typeface="Cambria Math" panose="02040503050406030204" pitchFamily="18" charset="0"/>
+                              </a:rPr>
+                              <m:t>𝑡</m:t>
+                            </m:r>
+                            <m:r>
+                              <a:rPr lang="en-US" altLang="zh-CN" sz="2400" i="1">
+                                <a:latin typeface="Cambria Math" panose="02040503050406030204" pitchFamily="18" charset="0"/>
+                              </a:rPr>
+                              <m:t>+1</m:t>
+                            </m:r>
+                          </m:e>
+                        </m:d>
+                        <m:r>
+                          <a:rPr lang="en-US" altLang="zh-CN" sz="2400" i="1">
+                            <a:latin typeface="Cambria Math" panose="02040503050406030204" pitchFamily="18" charset="0"/>
+                          </a:rPr>
+                          <m:t>−</m:t>
+                        </m:r>
+                        <m:r>
+                          <a:rPr lang="en-US" altLang="zh-CN" sz="2400" i="1">
+                            <a:latin typeface="Cambria Math" panose="02040503050406030204" pitchFamily="18" charset="0"/>
+                          </a:rPr>
+                          <m:t>𝑦</m:t>
+                        </m:r>
+                        <m:d>
+                          <m:dPr>
+                            <m:ctrlPr>
+                              <a:rPr lang="en-US" altLang="zh-CN" sz="2400" i="1">
+                                <a:latin typeface="Cambria Math" panose="02040503050406030204" pitchFamily="18" charset="0"/>
+                              </a:rPr>
+                            </m:ctrlPr>
+                          </m:dPr>
+                          <m:e>
+                            <m:r>
+                              <a:rPr lang="en-US" altLang="zh-CN" sz="2400" i="1">
+                                <a:latin typeface="Cambria Math" panose="02040503050406030204" pitchFamily="18" charset="0"/>
+                              </a:rPr>
+                              <m:t>𝑡</m:t>
+                            </m:r>
+                          </m:e>
+                        </m:d>
+                        <m:r>
+                          <a:rPr lang="en-US" altLang="zh-CN" sz="2400" i="1">
+                            <a:latin typeface="Cambria Math" panose="02040503050406030204" pitchFamily="18" charset="0"/>
+                          </a:rPr>
+                          <m:t>),</m:t>
+                        </m:r>
+                        <m:r>
+                          <m:rPr>
+                            <m:sty m:val="p"/>
+                          </m:rPr>
+                          <a:rPr lang="en-US" altLang="zh-CN" sz="2400" b="0" i="0" smtClean="0">
+                            <a:latin typeface="Cambria Math" panose="02040503050406030204" pitchFamily="18" charset="0"/>
+                          </a:rPr>
+                          <m:t>sin</m:t>
+                        </m:r>
+                      </m:fName>
+                      <m:e>
+                        <m:d>
+                          <m:dPr>
+                            <m:ctrlPr>
+                              <a:rPr lang="en-US" altLang="zh-CN" sz="2400" b="0" i="1" smtClean="0">
+                                <a:latin typeface="Cambria Math" panose="02040503050406030204" pitchFamily="18" charset="0"/>
+                              </a:rPr>
+                            </m:ctrlPr>
+                          </m:dPr>
+                          <m:e>
+                            <m:r>
+                              <a:rPr lang="en-US" altLang="zh-CN" sz="2400" b="0" i="1" smtClean="0">
+                                <a:latin typeface="Cambria Math" panose="02040503050406030204" pitchFamily="18" charset="0"/>
+                              </a:rPr>
+                              <m:t>𝑡h𝑒𝑡</m:t>
+                            </m:r>
+                            <m:sSub>
+                              <m:sSubPr>
+                                <m:ctrlPr>
+                                  <a:rPr lang="en-US" altLang="zh-CN" sz="2400" b="0" i="1" smtClean="0">
+                                    <a:latin typeface="Cambria Math" panose="02040503050406030204" pitchFamily="18" charset="0"/>
+                                  </a:rPr>
+                                </m:ctrlPr>
+                              </m:sSubPr>
+                              <m:e>
+                                <m:r>
+                                  <a:rPr lang="en-US" altLang="zh-CN" sz="2400" b="0" i="1" smtClean="0">
+                                    <a:latin typeface="Cambria Math" panose="02040503050406030204" pitchFamily="18" charset="0"/>
+                                  </a:rPr>
+                                  <m:t>𝑎</m:t>
+                                </m:r>
+                              </m:e>
+                              <m:sub>
+                                <m:r>
+                                  <a:rPr lang="en-US" altLang="zh-CN" sz="2400" b="0" i="1" smtClean="0">
+                                    <a:latin typeface="Cambria Math" panose="02040503050406030204" pitchFamily="18" charset="0"/>
+                                  </a:rPr>
+                                  <m:t>𝑟𝑒𝑓</m:t>
+                                </m:r>
+                              </m:sub>
+                            </m:sSub>
+                            <m:d>
+                              <m:dPr>
+                                <m:ctrlPr>
+                                  <a:rPr lang="en-US" altLang="zh-CN" sz="2400" b="0" i="1" smtClean="0">
+                                    <a:latin typeface="Cambria Math" panose="02040503050406030204" pitchFamily="18" charset="0"/>
+                                  </a:rPr>
+                                </m:ctrlPr>
+                              </m:dPr>
+                              <m:e>
+                                <m:r>
+                                  <a:rPr lang="en-US" altLang="zh-CN" sz="2400" b="0" i="1" smtClean="0">
+                                    <a:latin typeface="Cambria Math" panose="02040503050406030204" pitchFamily="18" charset="0"/>
+                                  </a:rPr>
+                                  <m:t>𝑡</m:t>
+                                </m:r>
+                                <m:r>
+                                  <a:rPr lang="en-US" altLang="zh-CN" sz="2400" b="0" i="1" smtClean="0">
+                                    <a:latin typeface="Cambria Math" panose="02040503050406030204" pitchFamily="18" charset="0"/>
+                                  </a:rPr>
+                                  <m:t>+1</m:t>
+                                </m:r>
+                              </m:e>
+                            </m:d>
+                            <m:r>
+                              <a:rPr lang="en-US" altLang="zh-CN" sz="2400" b="0" i="1" smtClean="0">
+                                <a:latin typeface="Cambria Math" panose="02040503050406030204" pitchFamily="18" charset="0"/>
+                              </a:rPr>
+                              <m:t>−</m:t>
+                            </m:r>
+                            <m:r>
+                              <a:rPr lang="en-US" altLang="zh-CN" sz="2400" b="0" i="1" smtClean="0">
+                                <a:latin typeface="Cambria Math" panose="02040503050406030204" pitchFamily="18" charset="0"/>
+                              </a:rPr>
+                              <m:t>𝑡h𝑒𝑡𝑎</m:t>
+                            </m:r>
+                            <m:d>
+                              <m:dPr>
+                                <m:ctrlPr>
+                                  <a:rPr lang="en-US" altLang="zh-CN" sz="2400" b="0" i="1" smtClean="0">
+                                    <a:latin typeface="Cambria Math" panose="02040503050406030204" pitchFamily="18" charset="0"/>
+                                  </a:rPr>
+                                </m:ctrlPr>
+                              </m:dPr>
+                              <m:e>
+                                <m:r>
+                                  <a:rPr lang="en-US" altLang="zh-CN" sz="2400" b="0" i="1" smtClean="0">
+                                    <a:latin typeface="Cambria Math" panose="02040503050406030204" pitchFamily="18" charset="0"/>
+                                  </a:rPr>
+                                  <m:t>𝑡</m:t>
+                                </m:r>
+                              </m:e>
+                            </m:d>
+                          </m:e>
+                        </m:d>
+                      </m:e>
+                    </m:func>
+                    <m:r>
+                      <a:rPr lang="en-US" altLang="zh-CN" sz="2400" b="0" i="1" smtClean="0">
+                        <a:latin typeface="Cambria Math" panose="02040503050406030204" pitchFamily="18" charset="0"/>
+                      </a:rPr>
+                      <m:t>,</m:t>
+                    </m:r>
+                    <m:func>
+                      <m:funcPr>
+                        <m:ctrlPr>
+                          <a:rPr lang="en-US" altLang="zh-CN" sz="2400" i="1">
+                            <a:latin typeface="Cambria Math" panose="02040503050406030204" pitchFamily="18" charset="0"/>
+                          </a:rPr>
+                        </m:ctrlPr>
+                      </m:funcPr>
+                      <m:fName>
+                        <m:r>
+                          <m:rPr>
+                            <m:sty m:val="p"/>
+                          </m:rPr>
+                          <a:rPr lang="en-US" altLang="zh-CN" sz="2400" b="0" i="0" smtClean="0">
+                            <a:latin typeface="Cambria Math" panose="02040503050406030204" pitchFamily="18" charset="0"/>
+                          </a:rPr>
+                          <m:t>cos</m:t>
+                        </m:r>
+                      </m:fName>
+                      <m:e>
+                        <m:d>
+                          <m:dPr>
+                            <m:ctrlPr>
+                              <a:rPr lang="en-US" altLang="zh-CN" sz="2400" i="1">
+                                <a:latin typeface="Cambria Math" panose="02040503050406030204" pitchFamily="18" charset="0"/>
+                              </a:rPr>
+                            </m:ctrlPr>
+                          </m:dPr>
+                          <m:e>
+                            <m:r>
+                              <a:rPr lang="en-US" altLang="zh-CN" sz="2400" i="1">
+                                <a:latin typeface="Cambria Math" panose="02040503050406030204" pitchFamily="18" charset="0"/>
+                              </a:rPr>
+                              <m:t>𝑡h𝑒𝑡</m:t>
+                            </m:r>
+                            <m:sSub>
+                              <m:sSubPr>
+                                <m:ctrlPr>
+                                  <a:rPr lang="en-US" altLang="zh-CN" sz="2400" i="1">
+                                    <a:latin typeface="Cambria Math" panose="02040503050406030204" pitchFamily="18" charset="0"/>
+                                  </a:rPr>
+                                </m:ctrlPr>
+                              </m:sSubPr>
+                              <m:e>
+                                <m:r>
+                                  <a:rPr lang="en-US" altLang="zh-CN" sz="2400" i="1">
+                                    <a:latin typeface="Cambria Math" panose="02040503050406030204" pitchFamily="18" charset="0"/>
+                                  </a:rPr>
+                                  <m:t>𝑎</m:t>
+                                </m:r>
+                              </m:e>
+                              <m:sub>
+                                <m:r>
+                                  <a:rPr lang="en-US" altLang="zh-CN" sz="2400" i="1">
+                                    <a:latin typeface="Cambria Math" panose="02040503050406030204" pitchFamily="18" charset="0"/>
+                                  </a:rPr>
+                                  <m:t>𝑟𝑒𝑓</m:t>
+                                </m:r>
+                              </m:sub>
+                            </m:sSub>
+                            <m:d>
+                              <m:dPr>
+                                <m:ctrlPr>
+                                  <a:rPr lang="en-US" altLang="zh-CN" sz="2400" i="1">
+                                    <a:latin typeface="Cambria Math" panose="02040503050406030204" pitchFamily="18" charset="0"/>
+                                  </a:rPr>
+                                </m:ctrlPr>
+                              </m:dPr>
+                              <m:e>
+                                <m:r>
+                                  <a:rPr lang="en-US" altLang="zh-CN" sz="2400" i="1">
+                                    <a:latin typeface="Cambria Math" panose="02040503050406030204" pitchFamily="18" charset="0"/>
+                                  </a:rPr>
+                                  <m:t>𝑡</m:t>
+                                </m:r>
+                                <m:r>
+                                  <a:rPr lang="en-US" altLang="zh-CN" sz="2400" i="1">
+                                    <a:latin typeface="Cambria Math" panose="02040503050406030204" pitchFamily="18" charset="0"/>
+                                  </a:rPr>
+                                  <m:t>+1</m:t>
+                                </m:r>
+                              </m:e>
+                            </m:d>
+                            <m:r>
+                              <a:rPr lang="en-US" altLang="zh-CN" sz="2400" i="1">
+                                <a:latin typeface="Cambria Math" panose="02040503050406030204" pitchFamily="18" charset="0"/>
+                              </a:rPr>
+                              <m:t>−</m:t>
+                            </m:r>
+                            <m:r>
+                              <a:rPr lang="en-US" altLang="zh-CN" sz="2400" i="1">
+                                <a:latin typeface="Cambria Math" panose="02040503050406030204" pitchFamily="18" charset="0"/>
+                              </a:rPr>
+                              <m:t>𝑡h𝑒𝑡𝑎</m:t>
+                            </m:r>
+                            <m:d>
+                              <m:dPr>
+                                <m:ctrlPr>
+                                  <a:rPr lang="en-US" altLang="zh-CN" sz="2400" i="1">
+                                    <a:latin typeface="Cambria Math" panose="02040503050406030204" pitchFamily="18" charset="0"/>
+                                  </a:rPr>
+                                </m:ctrlPr>
+                              </m:dPr>
+                              <m:e>
+                                <m:r>
+                                  <a:rPr lang="en-US" altLang="zh-CN" sz="2400" i="1">
+                                    <a:latin typeface="Cambria Math" panose="02040503050406030204" pitchFamily="18" charset="0"/>
+                                  </a:rPr>
+                                  <m:t>𝑡</m:t>
+                                </m:r>
+                              </m:e>
+                            </m:d>
+                          </m:e>
+                        </m:d>
+                      </m:e>
+                    </m:func>
+                    <m:r>
+                      <a:rPr lang="en-US" altLang="zh-CN" sz="2400" b="0" i="1" smtClean="0">
+                        <a:latin typeface="Cambria Math" panose="02040503050406030204" pitchFamily="18" charset="0"/>
+                      </a:rPr>
+                      <m:t>]</m:t>
+                    </m:r>
+                  </m:oMath>
+                </a14:m>
+                <a:endParaRPr lang="en-US" altLang="zh-CN" sz="2400" dirty="0" smtClean="0"/>
               </a:p>
             </p:txBody>
           </p:sp>
@@ -4063,7 +5118,7 @@
               <a:blipFill rotWithShape="0">
                 <a:blip r:embed="rId3"/>
                 <a:stretch>
-                  <a:fillRect l="-624" t="-839" r="-720"/>
+                  <a:fillRect l="-816" t="-1319" r="-1104"/>
                 </a:stretch>
               </a:blipFill>
             </p:spPr>
@@ -4129,36 +5184,6 @@
           </a:p>
         </p:txBody>
       </p:sp>
-      <p:pic>
-        <p:nvPicPr>
-          <p:cNvPr id="5" name="图片 4"/>
-          <p:cNvPicPr>
-            <a:picLocks noChangeAspect="1"/>
-          </p:cNvPicPr>
-          <p:nvPr/>
-        </p:nvPicPr>
-        <p:blipFill>
-          <a:blip r:embed="rId4">
-            <a:extLst>
-              <a:ext uri="{28A0092B-C50C-407E-A947-70E740481C1C}">
-                <a14:useLocalDpi xmlns:a14="http://schemas.microsoft.com/office/drawing/2010/main" val="0"/>
-              </a:ext>
-            </a:extLst>
-          </a:blip>
-          <a:stretch>
-            <a:fillRect/>
-          </a:stretch>
-        </p:blipFill>
-        <p:spPr>
-          <a:xfrm>
-            <a:off x="9732337" y="4458335"/>
-            <a:ext cx="2771775" cy="2257425"/>
-          </a:xfrm>
-          <a:prstGeom prst="rect">
-            <a:avLst/>
-          </a:prstGeom>
-        </p:spPr>
-      </p:pic>
     </p:spTree>
     <p:extLst>
       <p:ext uri="{BB962C8B-B14F-4D97-AF65-F5344CB8AC3E}">
@@ -4191,6 +5216,1990 @@
       </p:grpSpPr>
       <mc:AlternateContent xmlns:mc="http://schemas.openxmlformats.org/markup-compatibility/2006">
         <mc:Choice xmlns:a14="http://schemas.microsoft.com/office/drawing/2010/main" Requires="a14">
+          <p:sp>
+            <p:nvSpPr>
+              <p:cNvPr id="2" name="文本占位符 1"/>
+              <p:cNvSpPr>
+                <a:spLocks noGrp="1"/>
+              </p:cNvSpPr>
+              <p:nvPr>
+                <p:ph type="body" sz="quarter" idx="12"/>
+              </p:nvPr>
+            </p:nvSpPr>
+            <p:spPr/>
+            <p:txBody>
+              <a:bodyPr/>
+              <a:lstStyle/>
+              <a:p>
+                <a:pPr marL="0" indent="0">
+                  <a:buNone/>
+                </a:pPr>
+                <a:r>
+                  <a:rPr lang="en-US" altLang="zh-CN" dirty="0" smtClean="0"/>
+                  <a:t>Referenced from definition 4 and 5 from </a:t>
+                </a:r>
+                <a:r>
+                  <a:rPr lang="en-US" altLang="zh-CN" dirty="0" smtClean="0">
+                    <a:hlinkClick r:id="rId2"/>
+                  </a:rPr>
+                  <a:t>here</a:t>
+                </a:r>
+                <a:endParaRPr lang="en-US" altLang="zh-CN" dirty="0" smtClean="0"/>
+              </a:p>
+              <a:p>
+                <a:pPr marL="0" indent="0">
+                  <a:buNone/>
+                </a:pPr>
+                <a:r>
+                  <a:rPr lang="en-US" altLang="zh-CN" dirty="0" smtClean="0"/>
+                  <a:t>For reference </a:t>
+                </a:r>
+                <a:r>
+                  <a:rPr lang="en-US" altLang="zh-CN" dirty="0" smtClean="0"/>
+                  <a:t>trajectory</a:t>
+                </a:r>
+                <a:r>
+                  <a:rPr lang="en-US" altLang="zh-CN" dirty="0"/>
+                  <a:t>,</a:t>
+                </a:r>
+                <a:r>
+                  <a:rPr lang="en-US" altLang="zh-CN" dirty="0" smtClean="0"/>
+                  <a:t> </a:t>
+                </a:r>
+                <a14:m>
+                  <m:oMath xmlns:m="http://schemas.openxmlformats.org/officeDocument/2006/math">
+                    <m:r>
+                      <a:rPr lang="en-US" altLang="zh-CN" b="0" i="1" smtClean="0">
+                        <a:latin typeface="Cambria Math" panose="02040503050406030204" pitchFamily="18" charset="0"/>
+                      </a:rPr>
+                      <m:t>𝑝</m:t>
+                    </m:r>
+                    <m:r>
+                      <a:rPr lang="en-US" altLang="zh-CN" b="0" i="1" smtClean="0">
+                        <a:latin typeface="Cambria Math" panose="02040503050406030204" pitchFamily="18" charset="0"/>
+                      </a:rPr>
+                      <m:t>=[</m:t>
+                    </m:r>
+                    <m:sSub>
+                      <m:sSubPr>
+                        <m:ctrlPr>
+                          <a:rPr lang="en-US" altLang="zh-CN" b="0" i="1" smtClean="0">
+                            <a:latin typeface="Cambria Math" panose="02040503050406030204" pitchFamily="18" charset="0"/>
+                          </a:rPr>
+                        </m:ctrlPr>
+                      </m:sSubPr>
+                      <m:e>
+                        <m:r>
+                          <a:rPr lang="en-US" altLang="zh-CN" b="0" i="1" smtClean="0">
+                            <a:latin typeface="Cambria Math" panose="02040503050406030204" pitchFamily="18" charset="0"/>
+                          </a:rPr>
+                          <m:t>𝑝</m:t>
+                        </m:r>
+                      </m:e>
+                      <m:sub>
+                        <m:r>
+                          <a:rPr lang="en-US" altLang="zh-CN" b="0" i="1" smtClean="0">
+                            <a:latin typeface="Cambria Math" panose="02040503050406030204" pitchFamily="18" charset="0"/>
+                          </a:rPr>
+                          <m:t>0</m:t>
+                        </m:r>
+                      </m:sub>
+                    </m:sSub>
+                    <m:r>
+                      <a:rPr lang="en-US" altLang="zh-CN" b="0" i="1" smtClean="0">
+                        <a:latin typeface="Cambria Math" panose="02040503050406030204" pitchFamily="18" charset="0"/>
+                      </a:rPr>
+                      <m:t>,</m:t>
+                    </m:r>
+                    <m:sSub>
+                      <m:sSubPr>
+                        <m:ctrlPr>
+                          <a:rPr lang="en-US" altLang="zh-CN" b="0" i="1" smtClean="0">
+                            <a:latin typeface="Cambria Math" panose="02040503050406030204" pitchFamily="18" charset="0"/>
+                          </a:rPr>
+                        </m:ctrlPr>
+                      </m:sSubPr>
+                      <m:e>
+                        <m:r>
+                          <a:rPr lang="en-US" altLang="zh-CN" b="0" i="1" smtClean="0">
+                            <a:latin typeface="Cambria Math" panose="02040503050406030204" pitchFamily="18" charset="0"/>
+                          </a:rPr>
+                          <m:t>𝑝</m:t>
+                        </m:r>
+                      </m:e>
+                      <m:sub>
+                        <m:r>
+                          <a:rPr lang="en-US" altLang="zh-CN" b="0" i="1" smtClean="0">
+                            <a:latin typeface="Cambria Math" panose="02040503050406030204" pitchFamily="18" charset="0"/>
+                          </a:rPr>
+                          <m:t>1</m:t>
+                        </m:r>
+                      </m:sub>
+                    </m:sSub>
+                    <m:r>
+                      <a:rPr lang="en-US" altLang="zh-CN" b="0" i="1" smtClean="0">
+                        <a:latin typeface="Cambria Math" panose="02040503050406030204" pitchFamily="18" charset="0"/>
+                      </a:rPr>
+                      <m:t>,</m:t>
+                    </m:r>
+                    <m:sSub>
+                      <m:sSubPr>
+                        <m:ctrlPr>
+                          <a:rPr lang="en-US" altLang="zh-CN" b="0" i="1" smtClean="0">
+                            <a:latin typeface="Cambria Math" panose="02040503050406030204" pitchFamily="18" charset="0"/>
+                          </a:rPr>
+                        </m:ctrlPr>
+                      </m:sSubPr>
+                      <m:e>
+                        <m:r>
+                          <a:rPr lang="en-US" altLang="zh-CN" b="0" i="1" smtClean="0">
+                            <a:latin typeface="Cambria Math" panose="02040503050406030204" pitchFamily="18" charset="0"/>
+                          </a:rPr>
+                          <m:t>𝑝</m:t>
+                        </m:r>
+                      </m:e>
+                      <m:sub>
+                        <m:r>
+                          <a:rPr lang="en-US" altLang="zh-CN" b="0" i="1" smtClean="0">
+                            <a:latin typeface="Cambria Math" panose="02040503050406030204" pitchFamily="18" charset="0"/>
+                          </a:rPr>
+                          <m:t>2</m:t>
+                        </m:r>
+                      </m:sub>
+                    </m:sSub>
+                    <m:r>
+                      <a:rPr lang="en-US" altLang="zh-CN" b="0" i="1" smtClean="0">
+                        <a:latin typeface="Cambria Math" panose="02040503050406030204" pitchFamily="18" charset="0"/>
+                      </a:rPr>
+                      <m:t>,</m:t>
+                    </m:r>
+                    <m:sSub>
+                      <m:sSubPr>
+                        <m:ctrlPr>
+                          <a:rPr lang="en-US" altLang="zh-CN" b="0" i="1" smtClean="0">
+                            <a:latin typeface="Cambria Math" panose="02040503050406030204" pitchFamily="18" charset="0"/>
+                          </a:rPr>
+                        </m:ctrlPr>
+                      </m:sSubPr>
+                      <m:e>
+                        <m:r>
+                          <a:rPr lang="en-US" altLang="zh-CN" b="0" i="1" smtClean="0">
+                            <a:latin typeface="Cambria Math" panose="02040503050406030204" pitchFamily="18" charset="0"/>
+                          </a:rPr>
+                          <m:t>𝑝</m:t>
+                        </m:r>
+                      </m:e>
+                      <m:sub>
+                        <m:r>
+                          <a:rPr lang="en-US" altLang="zh-CN" b="0" i="1" smtClean="0">
+                            <a:latin typeface="Cambria Math" panose="02040503050406030204" pitchFamily="18" charset="0"/>
+                          </a:rPr>
+                          <m:t>3</m:t>
+                        </m:r>
+                      </m:sub>
+                    </m:sSub>
+                    <m:r>
+                      <a:rPr lang="en-US" altLang="zh-CN" b="0" i="1" smtClean="0">
+                        <a:latin typeface="Cambria Math" panose="02040503050406030204" pitchFamily="18" charset="0"/>
+                      </a:rPr>
+                      <m:t>]</m:t>
+                    </m:r>
+                  </m:oMath>
+                </a14:m>
+                <a:r>
+                  <a:rPr lang="en-US" altLang="zh-CN" dirty="0" smtClean="0"/>
+                  <a:t> are the start point and end point. </a:t>
+                </a:r>
+              </a:p>
+              <a:p>
+                <a:pPr marL="0" indent="0">
+                  <a:buNone/>
+                </a:pPr>
+                <a14:m>
+                  <m:oMath xmlns:m="http://schemas.openxmlformats.org/officeDocument/2006/math">
+                    <m:d>
+                      <m:dPr>
+                        <m:begChr m:val="["/>
+                        <m:endChr m:val="]"/>
+                        <m:ctrlPr>
+                          <a:rPr lang="en-US" altLang="zh-CN" b="0" i="1" smtClean="0">
+                            <a:latin typeface="Cambria Math" panose="02040503050406030204" pitchFamily="18" charset="0"/>
+                          </a:rPr>
+                        </m:ctrlPr>
+                      </m:dPr>
+                      <m:e>
+                        <m:sSub>
+                          <m:sSubPr>
+                            <m:ctrlPr>
+                              <a:rPr lang="en-US" altLang="zh-CN" b="0" i="1" smtClean="0">
+                                <a:latin typeface="Cambria Math" panose="02040503050406030204" pitchFamily="18" charset="0"/>
+                              </a:rPr>
+                            </m:ctrlPr>
+                          </m:sSubPr>
+                          <m:e>
+                            <m:r>
+                              <a:rPr lang="en-US" altLang="zh-CN" b="0" i="1" smtClean="0">
+                                <a:latin typeface="Cambria Math" panose="02040503050406030204" pitchFamily="18" charset="0"/>
+                              </a:rPr>
+                              <m:t>𝑝</m:t>
+                            </m:r>
+                          </m:e>
+                          <m:sub>
+                            <m:r>
+                              <a:rPr lang="en-US" altLang="zh-CN" b="0" i="1" smtClean="0">
+                                <a:latin typeface="Cambria Math" panose="02040503050406030204" pitchFamily="18" charset="0"/>
+                              </a:rPr>
+                              <m:t>0</m:t>
+                            </m:r>
+                          </m:sub>
+                        </m:sSub>
+                        <m:r>
+                          <a:rPr lang="en-US" altLang="zh-CN" b="0" i="1" smtClean="0">
+                            <a:latin typeface="Cambria Math" panose="02040503050406030204" pitchFamily="18" charset="0"/>
+                          </a:rPr>
+                          <m:t>,</m:t>
+                        </m:r>
+                        <m:sSub>
+                          <m:sSubPr>
+                            <m:ctrlPr>
+                              <a:rPr lang="en-US" altLang="zh-CN" b="0" i="1" smtClean="0">
+                                <a:latin typeface="Cambria Math" panose="02040503050406030204" pitchFamily="18" charset="0"/>
+                              </a:rPr>
+                            </m:ctrlPr>
+                          </m:sSubPr>
+                          <m:e>
+                            <m:r>
+                              <a:rPr lang="en-US" altLang="zh-CN" b="0" i="1" smtClean="0">
+                                <a:latin typeface="Cambria Math" panose="02040503050406030204" pitchFamily="18" charset="0"/>
+                              </a:rPr>
+                              <m:t>𝑝</m:t>
+                            </m:r>
+                          </m:e>
+                          <m:sub>
+                            <m:r>
+                              <a:rPr lang="en-US" altLang="zh-CN" b="0" i="1" smtClean="0">
+                                <a:latin typeface="Cambria Math" panose="02040503050406030204" pitchFamily="18" charset="0"/>
+                              </a:rPr>
+                              <m:t>1</m:t>
+                            </m:r>
+                          </m:sub>
+                        </m:sSub>
+                      </m:e>
+                    </m:d>
+                  </m:oMath>
+                </a14:m>
+                <a:r>
+                  <a:rPr lang="en-US" altLang="zh-CN" dirty="0" smtClean="0"/>
+                  <a:t> is the start point of the trajectory</a:t>
+                </a:r>
+              </a:p>
+              <a:p>
+                <a:pPr marL="0" indent="0">
+                  <a:buNone/>
+                </a:pPr>
+                <a14:m>
+                  <m:oMath xmlns:m="http://schemas.openxmlformats.org/officeDocument/2006/math">
+                    <m:r>
+                      <a:rPr lang="en-US" altLang="zh-CN" b="0" i="1" smtClean="0">
+                        <a:latin typeface="Cambria Math" panose="02040503050406030204" pitchFamily="18" charset="0"/>
+                      </a:rPr>
+                      <m:t>[</m:t>
+                    </m:r>
+                    <m:sSub>
+                      <m:sSubPr>
+                        <m:ctrlPr>
+                          <a:rPr lang="en-US" altLang="zh-CN" b="0" i="1" smtClean="0">
+                            <a:latin typeface="Cambria Math" panose="02040503050406030204" pitchFamily="18" charset="0"/>
+                          </a:rPr>
+                        </m:ctrlPr>
+                      </m:sSubPr>
+                      <m:e>
+                        <m:r>
+                          <a:rPr lang="en-US" altLang="zh-CN" b="0" i="1" smtClean="0">
+                            <a:latin typeface="Cambria Math" panose="02040503050406030204" pitchFamily="18" charset="0"/>
+                          </a:rPr>
+                          <m:t>𝑝</m:t>
+                        </m:r>
+                      </m:e>
+                      <m:sub>
+                        <m:r>
+                          <a:rPr lang="en-US" altLang="zh-CN" b="0" i="1" smtClean="0">
+                            <a:latin typeface="Cambria Math" panose="02040503050406030204" pitchFamily="18" charset="0"/>
+                          </a:rPr>
+                          <m:t>2</m:t>
+                        </m:r>
+                      </m:sub>
+                    </m:sSub>
+                    <m:r>
+                      <a:rPr lang="en-US" altLang="zh-CN" b="0" i="1" smtClean="0">
+                        <a:latin typeface="Cambria Math" panose="02040503050406030204" pitchFamily="18" charset="0"/>
+                      </a:rPr>
+                      <m:t>,</m:t>
+                    </m:r>
+                    <m:sSub>
+                      <m:sSubPr>
+                        <m:ctrlPr>
+                          <a:rPr lang="en-US" altLang="zh-CN" b="0" i="1" smtClean="0">
+                            <a:latin typeface="Cambria Math" panose="02040503050406030204" pitchFamily="18" charset="0"/>
+                          </a:rPr>
+                        </m:ctrlPr>
+                      </m:sSubPr>
+                      <m:e>
+                        <m:r>
+                          <a:rPr lang="en-US" altLang="zh-CN" b="0" i="1" smtClean="0">
+                            <a:latin typeface="Cambria Math" panose="02040503050406030204" pitchFamily="18" charset="0"/>
+                          </a:rPr>
+                          <m:t>𝑝</m:t>
+                        </m:r>
+                      </m:e>
+                      <m:sub>
+                        <m:r>
+                          <a:rPr lang="en-US" altLang="zh-CN" b="0" i="1" smtClean="0">
+                            <a:latin typeface="Cambria Math" panose="02040503050406030204" pitchFamily="18" charset="0"/>
+                          </a:rPr>
+                          <m:t>3</m:t>
+                        </m:r>
+                      </m:sub>
+                    </m:sSub>
+                    <m:r>
+                      <a:rPr lang="en-US" altLang="zh-CN" b="0" i="1" smtClean="0">
+                        <a:latin typeface="Cambria Math" panose="02040503050406030204" pitchFamily="18" charset="0"/>
+                      </a:rPr>
+                      <m:t>]</m:t>
+                    </m:r>
+                  </m:oMath>
+                </a14:m>
+                <a:r>
+                  <a:rPr lang="en-US" altLang="zh-CN" dirty="0" smtClean="0"/>
+                  <a:t> is the end point of the trajectory</a:t>
+                </a:r>
+              </a:p>
+              <a:p>
+                <a:pPr marL="0" indent="0">
+                  <a:buNone/>
+                </a:pPr>
+                <a14:m>
+                  <m:oMathPara xmlns:m="http://schemas.openxmlformats.org/officeDocument/2006/math">
+                    <m:oMathParaPr>
+                      <m:jc m:val="centerGroup"/>
+                    </m:oMathParaPr>
+                    <m:oMath xmlns:m="http://schemas.openxmlformats.org/officeDocument/2006/math">
+                      <m:r>
+                        <a:rPr lang="en-US" altLang="zh-CN" b="0" i="1" smtClean="0">
+                          <a:latin typeface="Cambria Math" panose="02040503050406030204" pitchFamily="18" charset="0"/>
+                        </a:rPr>
+                        <m:t>𝜌</m:t>
+                      </m:r>
+                      <m:d>
+                        <m:dPr>
+                          <m:ctrlPr>
+                            <a:rPr lang="en-US" altLang="zh-CN" b="0" i="1" smtClean="0">
+                              <a:latin typeface="Cambria Math" panose="02040503050406030204" pitchFamily="18" charset="0"/>
+                            </a:rPr>
+                          </m:ctrlPr>
+                        </m:dPr>
+                        <m:e>
+                          <m:r>
+                            <a:rPr lang="en-US" altLang="zh-CN" b="0" i="1" smtClean="0">
+                              <a:latin typeface="Cambria Math" panose="02040503050406030204" pitchFamily="18" charset="0"/>
+                            </a:rPr>
+                            <m:t>𝑝</m:t>
+                          </m:r>
+                        </m:e>
+                      </m:d>
+                      <m:r>
+                        <a:rPr lang="en-US" altLang="zh-CN" b="0" i="1" smtClean="0">
+                          <a:latin typeface="Cambria Math" panose="02040503050406030204" pitchFamily="18" charset="0"/>
+                        </a:rPr>
+                        <m:t>=[−</m:t>
+                      </m:r>
+                      <m:rad>
+                        <m:radPr>
+                          <m:degHide m:val="on"/>
+                          <m:ctrlPr>
+                            <a:rPr lang="en-US" altLang="zh-CN" b="0" i="1" smtClean="0">
+                              <a:latin typeface="Cambria Math" panose="02040503050406030204" pitchFamily="18" charset="0"/>
+                            </a:rPr>
+                          </m:ctrlPr>
+                        </m:radPr>
+                        <m:deg/>
+                        <m:e>
+                          <m:sSup>
+                            <m:sSupPr>
+                              <m:ctrlPr>
+                                <a:rPr lang="en-US" altLang="zh-CN" b="0" i="1" smtClean="0">
+                                  <a:latin typeface="Cambria Math" panose="02040503050406030204" pitchFamily="18" charset="0"/>
+                                </a:rPr>
+                              </m:ctrlPr>
+                            </m:sSupPr>
+                            <m:e>
+                              <m:d>
+                                <m:dPr>
+                                  <m:ctrlPr>
+                                    <a:rPr lang="en-US" altLang="zh-CN" b="0" i="1" smtClean="0">
+                                      <a:latin typeface="Cambria Math" panose="02040503050406030204" pitchFamily="18" charset="0"/>
+                                    </a:rPr>
+                                  </m:ctrlPr>
+                                </m:dPr>
+                                <m:e>
+                                  <m:sSub>
+                                    <m:sSubPr>
+                                      <m:ctrlPr>
+                                        <a:rPr lang="en-US" altLang="zh-CN" b="0" i="1" smtClean="0">
+                                          <a:latin typeface="Cambria Math" panose="02040503050406030204" pitchFamily="18" charset="0"/>
+                                        </a:rPr>
+                                      </m:ctrlPr>
+                                    </m:sSubPr>
+                                    <m:e>
+                                      <m:r>
+                                        <a:rPr lang="en-US" altLang="zh-CN" b="0" i="1" smtClean="0">
+                                          <a:latin typeface="Cambria Math" panose="02040503050406030204" pitchFamily="18" charset="0"/>
+                                        </a:rPr>
+                                        <m:t>𝑝</m:t>
+                                      </m:r>
+                                    </m:e>
+                                    <m:sub>
+                                      <m:r>
+                                        <a:rPr lang="en-US" altLang="zh-CN" b="0" i="1" smtClean="0">
+                                          <a:latin typeface="Cambria Math" panose="02040503050406030204" pitchFamily="18" charset="0"/>
+                                        </a:rPr>
+                                        <m:t>0</m:t>
+                                      </m:r>
+                                    </m:sub>
+                                  </m:sSub>
+                                  <m:r>
+                                    <a:rPr lang="en-US" altLang="zh-CN" b="0" i="1" smtClean="0">
+                                      <a:latin typeface="Cambria Math" panose="02040503050406030204" pitchFamily="18" charset="0"/>
+                                    </a:rPr>
+                                    <m:t>−</m:t>
+                                  </m:r>
+                                  <m:sSub>
+                                    <m:sSubPr>
+                                      <m:ctrlPr>
+                                        <a:rPr lang="en-US" altLang="zh-CN" b="0" i="1" smtClean="0">
+                                          <a:latin typeface="Cambria Math" panose="02040503050406030204" pitchFamily="18" charset="0"/>
+                                        </a:rPr>
+                                      </m:ctrlPr>
+                                    </m:sSubPr>
+                                    <m:e>
+                                      <m:r>
+                                        <a:rPr lang="en-US" altLang="zh-CN" b="0" i="1" smtClean="0">
+                                          <a:latin typeface="Cambria Math" panose="02040503050406030204" pitchFamily="18" charset="0"/>
+                                        </a:rPr>
+                                        <m:t>𝑝</m:t>
+                                      </m:r>
+                                    </m:e>
+                                    <m:sub>
+                                      <m:r>
+                                        <a:rPr lang="en-US" altLang="zh-CN" b="0" i="1" smtClean="0">
+                                          <a:latin typeface="Cambria Math" panose="02040503050406030204" pitchFamily="18" charset="0"/>
+                                        </a:rPr>
+                                        <m:t>2</m:t>
+                                      </m:r>
+                                    </m:sub>
+                                  </m:sSub>
+                                </m:e>
+                              </m:d>
+                            </m:e>
+                            <m:sup>
+                              <m:r>
+                                <a:rPr lang="en-US" altLang="zh-CN" b="0" i="1" smtClean="0">
+                                  <a:latin typeface="Cambria Math" panose="02040503050406030204" pitchFamily="18" charset="0"/>
+                                </a:rPr>
+                                <m:t>2</m:t>
+                              </m:r>
+                            </m:sup>
+                          </m:sSup>
+                          <m:r>
+                            <a:rPr lang="en-US" altLang="zh-CN" b="0" i="1" smtClean="0">
+                              <a:latin typeface="Cambria Math" panose="02040503050406030204" pitchFamily="18" charset="0"/>
+                            </a:rPr>
+                            <m:t>+</m:t>
+                          </m:r>
+                          <m:sSup>
+                            <m:sSupPr>
+                              <m:ctrlPr>
+                                <a:rPr lang="en-US" altLang="zh-CN" b="0" i="1" smtClean="0">
+                                  <a:latin typeface="Cambria Math" panose="02040503050406030204" pitchFamily="18" charset="0"/>
+                                </a:rPr>
+                              </m:ctrlPr>
+                            </m:sSupPr>
+                            <m:e>
+                              <m:d>
+                                <m:dPr>
+                                  <m:ctrlPr>
+                                    <a:rPr lang="en-US" altLang="zh-CN" b="0" i="1" smtClean="0">
+                                      <a:latin typeface="Cambria Math" panose="02040503050406030204" pitchFamily="18" charset="0"/>
+                                    </a:rPr>
+                                  </m:ctrlPr>
+                                </m:dPr>
+                                <m:e>
+                                  <m:sSub>
+                                    <m:sSubPr>
+                                      <m:ctrlPr>
+                                        <a:rPr lang="en-US" altLang="zh-CN" b="0" i="1" smtClean="0">
+                                          <a:latin typeface="Cambria Math" panose="02040503050406030204" pitchFamily="18" charset="0"/>
+                                        </a:rPr>
+                                      </m:ctrlPr>
+                                    </m:sSubPr>
+                                    <m:e>
+                                      <m:r>
+                                        <a:rPr lang="en-US" altLang="zh-CN" b="0" i="1" smtClean="0">
+                                          <a:latin typeface="Cambria Math" panose="02040503050406030204" pitchFamily="18" charset="0"/>
+                                        </a:rPr>
+                                        <m:t>𝑝</m:t>
+                                      </m:r>
+                                    </m:e>
+                                    <m:sub>
+                                      <m:r>
+                                        <a:rPr lang="en-US" altLang="zh-CN" b="0" i="1" smtClean="0">
+                                          <a:latin typeface="Cambria Math" panose="02040503050406030204" pitchFamily="18" charset="0"/>
+                                        </a:rPr>
+                                        <m:t>1</m:t>
+                                      </m:r>
+                                    </m:sub>
+                                  </m:sSub>
+                                  <m:r>
+                                    <a:rPr lang="en-US" altLang="zh-CN" b="0" i="1" smtClean="0">
+                                      <a:latin typeface="Cambria Math" panose="02040503050406030204" pitchFamily="18" charset="0"/>
+                                    </a:rPr>
+                                    <m:t>−</m:t>
+                                  </m:r>
+                                  <m:sSub>
+                                    <m:sSubPr>
+                                      <m:ctrlPr>
+                                        <a:rPr lang="en-US" altLang="zh-CN" b="0" i="1" smtClean="0">
+                                          <a:latin typeface="Cambria Math" panose="02040503050406030204" pitchFamily="18" charset="0"/>
+                                        </a:rPr>
+                                      </m:ctrlPr>
+                                    </m:sSubPr>
+                                    <m:e>
+                                      <m:r>
+                                        <a:rPr lang="en-US" altLang="zh-CN" b="0" i="1" smtClean="0">
+                                          <a:latin typeface="Cambria Math" panose="02040503050406030204" pitchFamily="18" charset="0"/>
+                                        </a:rPr>
+                                        <m:t>𝑝</m:t>
+                                      </m:r>
+                                    </m:e>
+                                    <m:sub>
+                                      <m:r>
+                                        <a:rPr lang="en-US" altLang="zh-CN" b="0" i="1" smtClean="0">
+                                          <a:latin typeface="Cambria Math" panose="02040503050406030204" pitchFamily="18" charset="0"/>
+                                        </a:rPr>
+                                        <m:t>3</m:t>
+                                      </m:r>
+                                    </m:sub>
+                                  </m:sSub>
+                                </m:e>
+                              </m:d>
+                            </m:e>
+                            <m:sup>
+                              <m:r>
+                                <a:rPr lang="en-US" altLang="zh-CN" b="0" i="1" smtClean="0">
+                                  <a:latin typeface="Cambria Math" panose="02040503050406030204" pitchFamily="18" charset="0"/>
+                                </a:rPr>
+                                <m:t>2</m:t>
+                              </m:r>
+                            </m:sup>
+                          </m:sSup>
+                        </m:e>
+                      </m:rad>
+                      <m:r>
+                        <a:rPr lang="en-US" altLang="zh-CN" b="0" i="1" smtClean="0">
+                          <a:latin typeface="Cambria Math" panose="02040503050406030204" pitchFamily="18" charset="0"/>
+                        </a:rPr>
+                        <m:t>,0,0,0]</m:t>
+                      </m:r>
+                    </m:oMath>
+                  </m:oMathPara>
+                </a14:m>
+                <a:endParaRPr lang="en-US" altLang="zh-CN" dirty="0" smtClean="0"/>
+              </a:p>
+            </p:txBody>
+          </p:sp>
+        </mc:Choice>
+        <mc:Fallback>
+          <p:sp>
+            <p:nvSpPr>
+              <p:cNvPr id="2" name="文本占位符 1"/>
+              <p:cNvSpPr>
+                <a:spLocks noGrp="1" noRot="1" noChangeAspect="1" noMove="1" noResize="1" noEditPoints="1" noAdjustHandles="1" noChangeArrowheads="1" noChangeShapeType="1" noTextEdit="1"/>
+              </p:cNvSpPr>
+              <p:nvPr>
+                <p:ph type="body" sz="quarter" idx="12"/>
+              </p:nvPr>
+            </p:nvSpPr>
+            <p:spPr>
+              <a:blipFill rotWithShape="0">
+                <a:blip r:embed="rId3"/>
+                <a:stretch>
+                  <a:fillRect l="-1440" t="-1918"/>
+                </a:stretch>
+              </a:blipFill>
+            </p:spPr>
+            <p:txBody>
+              <a:bodyPr/>
+              <a:lstStyle/>
+              <a:p>
+                <a:r>
+                  <a:rPr lang="zh-CN" altLang="en-US">
+                    <a:noFill/>
+                  </a:rPr>
+                  <a:t> </a:t>
+                </a:r>
+              </a:p>
+            </p:txBody>
+          </p:sp>
+        </mc:Fallback>
+      </mc:AlternateContent>
+      <p:sp>
+        <p:nvSpPr>
+          <p:cNvPr id="3" name="文本占位符 2"/>
+          <p:cNvSpPr>
+            <a:spLocks noGrp="1"/>
+          </p:cNvSpPr>
+          <p:nvPr>
+            <p:ph type="body" sz="quarter" idx="10"/>
+          </p:nvPr>
+        </p:nvSpPr>
+        <p:spPr/>
+        <p:txBody>
+          <a:bodyPr/>
+          <a:lstStyle/>
+          <a:p>
+            <a:r>
+              <a:rPr lang="en-US" altLang="zh-CN" dirty="0" smtClean="0"/>
+              <a:t>Translation and rotation symmetry of the system</a:t>
+            </a:r>
+            <a:endParaRPr lang="zh-CN" altLang="en-US" dirty="0"/>
+          </a:p>
+        </p:txBody>
+      </p:sp>
+      <p:sp>
+        <p:nvSpPr>
+          <p:cNvPr id="4" name="灯片编号占位符 3"/>
+          <p:cNvSpPr>
+            <a:spLocks noGrp="1"/>
+          </p:cNvSpPr>
+          <p:nvPr>
+            <p:ph type="sldNum" sz="quarter" idx="4"/>
+          </p:nvPr>
+        </p:nvSpPr>
+        <p:spPr/>
+        <p:txBody>
+          <a:bodyPr/>
+          <a:lstStyle/>
+          <a:p>
+            <a:fld id="{7DAA0FC6-F71F-4650-BE21-9A15F164E712}" type="slidenum">
+              <a:rPr lang="en-US" smtClean="0"/>
+              <a:pPr/>
+              <a:t>5</a:t>
+            </a:fld>
+            <a:endParaRPr lang="en-US" dirty="0"/>
+          </a:p>
+        </p:txBody>
+      </p:sp>
+    </p:spTree>
+    <p:extLst>
+      <p:ext uri="{BB962C8B-B14F-4D97-AF65-F5344CB8AC3E}">
+        <p14:creationId xmlns:p14="http://schemas.microsoft.com/office/powerpoint/2010/main" val="581303565"/>
+      </p:ext>
+    </p:extLst>
+  </p:cSld>
+  <p:clrMapOvr>
+    <a:masterClrMapping/>
+  </p:clrMapOvr>
+</p:sld>
+</file>
+
+<file path=ppt/slides/slide6.xml><?xml version="1.0" encoding="utf-8"?>
+<p:sld xmlns:a="http://schemas.openxmlformats.org/drawingml/2006/main" xmlns:r="http://schemas.openxmlformats.org/officeDocument/2006/relationships" xmlns:p="http://schemas.openxmlformats.org/presentationml/2006/main">
+  <p:cSld>
+    <p:spTree>
+      <p:nvGrpSpPr>
+        <p:cNvPr id="1" name=""/>
+        <p:cNvGrpSpPr/>
+        <p:nvPr/>
+      </p:nvGrpSpPr>
+      <p:grpSpPr>
+        <a:xfrm>
+          <a:off x="0" y="0"/>
+          <a:ext cx="0" cy="0"/>
+          <a:chOff x="0" y="0"/>
+          <a:chExt cx="0" cy="0"/>
+        </a:xfrm>
+      </p:grpSpPr>
+      <mc:AlternateContent xmlns:mc="http://schemas.openxmlformats.org/markup-compatibility/2006" xmlns:a14="http://schemas.microsoft.com/office/drawing/2010/main">
+        <mc:Choice Requires="a14">
+          <p:sp>
+            <p:nvSpPr>
+              <p:cNvPr id="2" name="文本占位符 1"/>
+              <p:cNvSpPr>
+                <a:spLocks noGrp="1"/>
+              </p:cNvSpPr>
+              <p:nvPr>
+                <p:ph type="body" sz="quarter" idx="12"/>
+              </p:nvPr>
+            </p:nvSpPr>
+            <p:spPr/>
+            <p:txBody>
+              <a:bodyPr/>
+              <a:lstStyle/>
+              <a:p>
+                <a:pPr marL="0" indent="0">
+                  <a:buNone/>
+                </a:pPr>
+                <a14:m>
+                  <m:oMath xmlns:m="http://schemas.openxmlformats.org/officeDocument/2006/math">
+                    <m:r>
+                      <a:rPr lang="en-US" altLang="zh-CN" sz="3200" i="1" smtClean="0">
+                        <a:latin typeface="Cambria Math" panose="02040503050406030204" pitchFamily="18" charset="0"/>
+                      </a:rPr>
+                      <m:t>𝑥</m:t>
+                    </m:r>
+                    <m:r>
+                      <a:rPr lang="en-US" altLang="zh-CN" sz="3200" i="1" smtClean="0">
+                        <a:latin typeface="Cambria Math" panose="02040503050406030204" pitchFamily="18" charset="0"/>
+                      </a:rPr>
+                      <m:t>=[</m:t>
+                    </m:r>
+                    <m:sSub>
+                      <m:sSubPr>
+                        <m:ctrlPr>
+                          <a:rPr lang="en-US" altLang="zh-CN" sz="3200" i="1">
+                            <a:latin typeface="Cambria Math" panose="02040503050406030204" pitchFamily="18" charset="0"/>
+                          </a:rPr>
+                        </m:ctrlPr>
+                      </m:sSubPr>
+                      <m:e>
+                        <m:r>
+                          <a:rPr lang="en-US" altLang="zh-CN" sz="3200" i="1">
+                            <a:latin typeface="Cambria Math" panose="02040503050406030204" pitchFamily="18" charset="0"/>
+                          </a:rPr>
+                          <m:t>𝑥</m:t>
+                        </m:r>
+                      </m:e>
+                      <m:sub>
+                        <m:r>
+                          <a:rPr lang="en-US" altLang="zh-CN" sz="3200" i="1">
+                            <a:latin typeface="Cambria Math" panose="02040503050406030204" pitchFamily="18" charset="0"/>
+                          </a:rPr>
+                          <m:t>0</m:t>
+                        </m:r>
+                      </m:sub>
+                    </m:sSub>
+                    <m:r>
+                      <a:rPr lang="en-US" altLang="zh-CN" sz="3200" i="1">
+                        <a:latin typeface="Cambria Math" panose="02040503050406030204" pitchFamily="18" charset="0"/>
+                      </a:rPr>
+                      <m:t>,</m:t>
+                    </m:r>
+                    <m:sSub>
+                      <m:sSubPr>
+                        <m:ctrlPr>
+                          <a:rPr lang="en-US" altLang="zh-CN" sz="3200" i="1">
+                            <a:latin typeface="Cambria Math" panose="02040503050406030204" pitchFamily="18" charset="0"/>
+                          </a:rPr>
+                        </m:ctrlPr>
+                      </m:sSubPr>
+                      <m:e>
+                        <m:r>
+                          <a:rPr lang="en-US" altLang="zh-CN" sz="3200" i="1">
+                            <a:latin typeface="Cambria Math" panose="02040503050406030204" pitchFamily="18" charset="0"/>
+                          </a:rPr>
+                          <m:t>𝑥</m:t>
+                        </m:r>
+                      </m:e>
+                      <m:sub>
+                        <m:r>
+                          <a:rPr lang="en-US" altLang="zh-CN" sz="3200" i="1">
+                            <a:latin typeface="Cambria Math" panose="02040503050406030204" pitchFamily="18" charset="0"/>
+                          </a:rPr>
+                          <m:t>1</m:t>
+                        </m:r>
+                      </m:sub>
+                    </m:sSub>
+                    <m:r>
+                      <a:rPr lang="en-US" altLang="zh-CN" sz="3200" i="1">
+                        <a:latin typeface="Cambria Math" panose="02040503050406030204" pitchFamily="18" charset="0"/>
+                      </a:rPr>
+                      <m:t>,</m:t>
+                    </m:r>
+                    <m:sSub>
+                      <m:sSubPr>
+                        <m:ctrlPr>
+                          <a:rPr lang="en-US" altLang="zh-CN" sz="3200" i="1">
+                            <a:latin typeface="Cambria Math" panose="02040503050406030204" pitchFamily="18" charset="0"/>
+                          </a:rPr>
+                        </m:ctrlPr>
+                      </m:sSubPr>
+                      <m:e>
+                        <m:r>
+                          <a:rPr lang="en-US" altLang="zh-CN" sz="3200" i="1">
+                            <a:latin typeface="Cambria Math" panose="02040503050406030204" pitchFamily="18" charset="0"/>
+                          </a:rPr>
+                          <m:t>𝑥</m:t>
+                        </m:r>
+                      </m:e>
+                      <m:sub>
+                        <m:r>
+                          <a:rPr lang="en-US" altLang="zh-CN" sz="3200" b="0" i="1" smtClean="0">
+                            <a:latin typeface="Cambria Math" panose="02040503050406030204" pitchFamily="18" charset="0"/>
+                          </a:rPr>
+                          <m:t>2</m:t>
+                        </m:r>
+                      </m:sub>
+                    </m:sSub>
+                    <m:r>
+                      <a:rPr lang="en-US" altLang="zh-CN" sz="3200" i="1">
+                        <a:latin typeface="Cambria Math" panose="02040503050406030204" pitchFamily="18" charset="0"/>
+                      </a:rPr>
+                      <m:t>]</m:t>
+                    </m:r>
+                  </m:oMath>
+                </a14:m>
+                <a:r>
+                  <a:rPr lang="zh-CN" altLang="en-US" sz="3200" dirty="0"/>
+                  <a:t> </a:t>
+                </a:r>
+                <a:r>
+                  <a:rPr lang="en-US" altLang="zh-CN" sz="3200" dirty="0"/>
+                  <a:t>is the state of the system.</a:t>
+                </a:r>
+              </a:p>
+              <a:p>
+                <a:pPr marL="0" indent="0">
+                  <a:buNone/>
+                </a:pPr>
+                <a14:m>
+                  <m:oMath xmlns:m="http://schemas.openxmlformats.org/officeDocument/2006/math">
+                    <m:sSub>
+                      <m:sSubPr>
+                        <m:ctrlPr>
+                          <a:rPr lang="en-US" altLang="zh-CN" sz="3200" i="1">
+                            <a:latin typeface="Cambria Math" panose="02040503050406030204" pitchFamily="18" charset="0"/>
+                          </a:rPr>
+                        </m:ctrlPr>
+                      </m:sSubPr>
+                      <m:e>
+                        <m:r>
+                          <a:rPr lang="en-US" altLang="zh-CN" sz="3200" i="1">
+                            <a:latin typeface="Cambria Math" panose="02040503050406030204" pitchFamily="18" charset="0"/>
+                          </a:rPr>
+                          <m:t>𝑥</m:t>
+                        </m:r>
+                      </m:e>
+                      <m:sub>
+                        <m:r>
+                          <a:rPr lang="en-US" altLang="zh-CN" sz="3200" i="1">
+                            <a:latin typeface="Cambria Math" panose="02040503050406030204" pitchFamily="18" charset="0"/>
+                          </a:rPr>
+                          <m:t>0</m:t>
+                        </m:r>
+                      </m:sub>
+                    </m:sSub>
+                  </m:oMath>
+                </a14:m>
+                <a:r>
+                  <a:rPr lang="zh-CN" altLang="en-US" sz="3200" dirty="0"/>
+                  <a:t> </a:t>
+                </a:r>
+                <a:r>
+                  <a:rPr lang="en-US" altLang="zh-CN" sz="3200" dirty="0"/>
+                  <a:t>is the </a:t>
+                </a:r>
+                <a:r>
+                  <a:rPr lang="en-US" altLang="zh-CN" sz="3200" dirty="0" smtClean="0"/>
+                  <a:t>x position of the vehicle</a:t>
+                </a:r>
+              </a:p>
+              <a:p>
+                <a:pPr marL="0" indent="0">
+                  <a:buNone/>
+                </a:pPr>
+                <a14:m>
+                  <m:oMath xmlns:m="http://schemas.openxmlformats.org/officeDocument/2006/math">
+                    <m:sSub>
+                      <m:sSubPr>
+                        <m:ctrlPr>
+                          <a:rPr lang="en-US" altLang="zh-CN" sz="3200" b="0" i="1" smtClean="0">
+                            <a:latin typeface="Cambria Math" panose="02040503050406030204" pitchFamily="18" charset="0"/>
+                          </a:rPr>
+                        </m:ctrlPr>
+                      </m:sSubPr>
+                      <m:e>
+                        <m:r>
+                          <a:rPr lang="en-US" altLang="zh-CN" sz="3200" b="0" i="1" smtClean="0">
+                            <a:latin typeface="Cambria Math" panose="02040503050406030204" pitchFamily="18" charset="0"/>
+                          </a:rPr>
+                          <m:t>𝑥</m:t>
+                        </m:r>
+                      </m:e>
+                      <m:sub>
+                        <m:r>
+                          <a:rPr lang="en-US" altLang="zh-CN" sz="3200" b="0" i="1" smtClean="0">
+                            <a:latin typeface="Cambria Math" panose="02040503050406030204" pitchFamily="18" charset="0"/>
+                          </a:rPr>
+                          <m:t>1</m:t>
+                        </m:r>
+                      </m:sub>
+                    </m:sSub>
+                  </m:oMath>
+                </a14:m>
+                <a:r>
+                  <a:rPr lang="zh-CN" altLang="en-US" sz="3200" dirty="0" smtClean="0"/>
+                  <a:t> </a:t>
+                </a:r>
+                <a:r>
+                  <a:rPr lang="en-US" altLang="zh-CN" sz="3200" dirty="0" smtClean="0"/>
+                  <a:t>is the y position of the vehicle</a:t>
+                </a:r>
+              </a:p>
+              <a:p>
+                <a:pPr marL="0" indent="0">
+                  <a:buNone/>
+                </a:pPr>
+                <a14:m>
+                  <m:oMath xmlns:m="http://schemas.openxmlformats.org/officeDocument/2006/math">
+                    <m:sSub>
+                      <m:sSubPr>
+                        <m:ctrlPr>
+                          <a:rPr lang="en-US" altLang="zh-CN" sz="3200" b="0" i="1" smtClean="0">
+                            <a:latin typeface="Cambria Math" panose="02040503050406030204" pitchFamily="18" charset="0"/>
+                          </a:rPr>
+                        </m:ctrlPr>
+                      </m:sSubPr>
+                      <m:e>
+                        <m:r>
+                          <a:rPr lang="en-US" altLang="zh-CN" sz="3200" b="0" i="1" smtClean="0">
+                            <a:latin typeface="Cambria Math" panose="02040503050406030204" pitchFamily="18" charset="0"/>
+                          </a:rPr>
+                          <m:t>𝑥</m:t>
+                        </m:r>
+                      </m:e>
+                      <m:sub>
+                        <m:r>
+                          <a:rPr lang="en-US" altLang="zh-CN" sz="3200" b="0" i="1" smtClean="0">
+                            <a:latin typeface="Cambria Math" panose="02040503050406030204" pitchFamily="18" charset="0"/>
+                          </a:rPr>
+                          <m:t>2</m:t>
+                        </m:r>
+                      </m:sub>
+                    </m:sSub>
+                  </m:oMath>
+                </a14:m>
+                <a:r>
+                  <a:rPr lang="zh-CN" altLang="en-US" sz="3200" dirty="0" smtClean="0"/>
+                  <a:t> </a:t>
+                </a:r>
+                <a:r>
+                  <a:rPr lang="en-US" altLang="zh-CN" sz="3200" dirty="0" smtClean="0"/>
+                  <a:t>is the orientation of the vehicle</a:t>
+                </a:r>
+              </a:p>
+              <a:p>
+                <a:pPr marL="0" indent="0">
+                  <a:buNone/>
+                </a:pPr>
+                <a14:m>
+                  <m:oMathPara xmlns:m="http://schemas.openxmlformats.org/officeDocument/2006/math">
+                    <m:oMathParaPr>
+                      <m:jc m:val="centerGroup"/>
+                    </m:oMathParaPr>
+                    <m:oMath xmlns:m="http://schemas.openxmlformats.org/officeDocument/2006/math">
+                      <m:r>
+                        <a:rPr lang="en-US" altLang="zh-CN" sz="2800" b="0" i="1" smtClean="0">
+                          <a:latin typeface="Cambria Math" panose="02040503050406030204" pitchFamily="18" charset="0"/>
+                        </a:rPr>
+                        <m:t>𝛾</m:t>
+                      </m:r>
+                      <m:d>
+                        <m:dPr>
+                          <m:ctrlPr>
+                            <a:rPr lang="en-US" altLang="zh-CN" sz="2800" b="0" i="1" smtClean="0">
+                              <a:latin typeface="Cambria Math" panose="02040503050406030204" pitchFamily="18" charset="0"/>
+                            </a:rPr>
+                          </m:ctrlPr>
+                        </m:dPr>
+                        <m:e>
+                          <m:r>
+                            <a:rPr lang="en-US" altLang="zh-CN" sz="2800" b="0" i="1" smtClean="0">
+                              <a:latin typeface="Cambria Math" panose="02040503050406030204" pitchFamily="18" charset="0"/>
+                            </a:rPr>
+                            <m:t>𝑥</m:t>
+                          </m:r>
+                        </m:e>
+                      </m:d>
+                      <m:r>
+                        <a:rPr lang="en-US" altLang="zh-CN" sz="2800" b="0" i="1" smtClean="0">
+                          <a:latin typeface="Cambria Math" panose="02040503050406030204" pitchFamily="18" charset="0"/>
+                        </a:rPr>
+                        <m:t>=[</m:t>
+                      </m:r>
+                      <m:rad>
+                        <m:radPr>
+                          <m:degHide m:val="on"/>
+                          <m:ctrlPr>
+                            <a:rPr lang="en-US" altLang="zh-CN" sz="2800" b="0" i="1" smtClean="0">
+                              <a:latin typeface="Cambria Math" panose="02040503050406030204" pitchFamily="18" charset="0"/>
+                            </a:rPr>
+                          </m:ctrlPr>
+                        </m:radPr>
+                        <m:deg/>
+                        <m:e>
+                          <m:sSubSup>
+                            <m:sSubSupPr>
+                              <m:ctrlPr>
+                                <a:rPr lang="en-US" altLang="zh-CN" sz="2800" b="0" i="1" smtClean="0">
+                                  <a:latin typeface="Cambria Math" panose="02040503050406030204" pitchFamily="18" charset="0"/>
+                                </a:rPr>
+                              </m:ctrlPr>
+                            </m:sSubSupPr>
+                            <m:e>
+                              <m:r>
+                                <a:rPr lang="en-US" altLang="zh-CN" sz="2800" b="0" i="1" smtClean="0">
+                                  <a:latin typeface="Cambria Math" panose="02040503050406030204" pitchFamily="18" charset="0"/>
+                                </a:rPr>
+                                <m:t>𝑥</m:t>
+                              </m:r>
+                            </m:e>
+                            <m:sub>
+                              <m:r>
+                                <a:rPr lang="en-US" altLang="zh-CN" sz="2800" b="0" i="1" smtClean="0">
+                                  <a:latin typeface="Cambria Math" panose="02040503050406030204" pitchFamily="18" charset="0"/>
+                                </a:rPr>
+                                <m:t>0</m:t>
+                              </m:r>
+                            </m:sub>
+                            <m:sup>
+                              <m:r>
+                                <a:rPr lang="en-US" altLang="zh-CN" sz="2800" b="0" i="1" smtClean="0">
+                                  <a:latin typeface="Cambria Math" panose="02040503050406030204" pitchFamily="18" charset="0"/>
+                                </a:rPr>
+                                <m:t>2</m:t>
+                              </m:r>
+                            </m:sup>
+                          </m:sSubSup>
+                          <m:r>
+                            <a:rPr lang="en-US" altLang="zh-CN" sz="2800" i="1">
+                              <a:latin typeface="Cambria Math" panose="02040503050406030204" pitchFamily="18" charset="0"/>
+                            </a:rPr>
+                            <m:t>+</m:t>
+                          </m:r>
+                          <m:sSubSup>
+                            <m:sSubSupPr>
+                              <m:ctrlPr>
+                                <a:rPr lang="en-US" altLang="zh-CN" sz="2800" i="1">
+                                  <a:latin typeface="Cambria Math" panose="02040503050406030204" pitchFamily="18" charset="0"/>
+                                </a:rPr>
+                              </m:ctrlPr>
+                            </m:sSubSupPr>
+                            <m:e>
+                              <m:r>
+                                <a:rPr lang="en-US" altLang="zh-CN" sz="2800" i="1">
+                                  <a:latin typeface="Cambria Math" panose="02040503050406030204" pitchFamily="18" charset="0"/>
+                                </a:rPr>
+                                <m:t>𝑥</m:t>
+                              </m:r>
+                            </m:e>
+                            <m:sub>
+                              <m:r>
+                                <a:rPr lang="en-US" altLang="zh-CN" sz="2800" i="1">
+                                  <a:latin typeface="Cambria Math" panose="02040503050406030204" pitchFamily="18" charset="0"/>
+                                </a:rPr>
+                                <m:t>1</m:t>
+                              </m:r>
+                            </m:sub>
+                            <m:sup>
+                              <m:r>
+                                <a:rPr lang="en-US" altLang="zh-CN" sz="2800" i="1">
+                                  <a:latin typeface="Cambria Math" panose="02040503050406030204" pitchFamily="18" charset="0"/>
+                                </a:rPr>
+                                <m:t>2</m:t>
+                              </m:r>
+                            </m:sup>
+                          </m:sSubSup>
+                        </m:e>
+                      </m:rad>
+                      <m:r>
+                        <m:rPr>
+                          <m:sty m:val="p"/>
+                        </m:rPr>
+                        <a:rPr lang="en-US" altLang="zh-CN" sz="2800" b="0" i="0" smtClean="0">
+                          <a:latin typeface="Cambria Math" panose="02040503050406030204" pitchFamily="18" charset="0"/>
+                        </a:rPr>
+                        <m:t>cos</m:t>
+                      </m:r>
+                      <m:r>
+                        <a:rPr lang="en-US" altLang="zh-CN" sz="2800" b="0" i="1" smtClean="0">
+                          <a:latin typeface="Cambria Math" panose="02040503050406030204" pitchFamily="18" charset="0"/>
+                        </a:rPr>
+                        <m:t>⁡(</m:t>
+                      </m:r>
+                      <m:func>
+                        <m:funcPr>
+                          <m:ctrlPr>
+                            <a:rPr lang="en-US" altLang="zh-CN" sz="2800" b="0" i="1" smtClean="0">
+                              <a:latin typeface="Cambria Math" panose="02040503050406030204" pitchFamily="18" charset="0"/>
+                            </a:rPr>
+                          </m:ctrlPr>
+                        </m:funcPr>
+                        <m:fName>
+                          <m:r>
+                            <m:rPr>
+                              <m:sty m:val="p"/>
+                            </m:rPr>
+                            <a:rPr lang="en-US" altLang="zh-CN" sz="2800" b="0" i="0" smtClean="0">
+                              <a:latin typeface="Cambria Math" panose="02040503050406030204" pitchFamily="18" charset="0"/>
+                            </a:rPr>
+                            <m:t>arctan</m:t>
+                          </m:r>
+                        </m:fName>
+                        <m:e>
+                          <m:d>
+                            <m:dPr>
+                              <m:ctrlPr>
+                                <a:rPr lang="en-US" altLang="zh-CN" sz="2800" b="0" i="1" smtClean="0">
+                                  <a:latin typeface="Cambria Math" panose="02040503050406030204" pitchFamily="18" charset="0"/>
+                                </a:rPr>
+                              </m:ctrlPr>
+                            </m:dPr>
+                            <m:e>
+                              <m:r>
+                                <a:rPr lang="en-US" altLang="zh-CN" sz="2800" b="0" i="1" smtClean="0">
+                                  <a:latin typeface="Cambria Math" panose="02040503050406030204" pitchFamily="18" charset="0"/>
+                                </a:rPr>
+                                <m:t>𝑦</m:t>
+                              </m:r>
+                              <m:r>
+                                <a:rPr lang="en-US" altLang="zh-CN" sz="2800" b="0" i="1" smtClean="0">
+                                  <a:latin typeface="Cambria Math" panose="02040503050406030204" pitchFamily="18" charset="0"/>
+                                </a:rPr>
+                                <m:t>,</m:t>
+                              </m:r>
+                              <m:r>
+                                <a:rPr lang="en-US" altLang="zh-CN" sz="2800" b="0" i="1" smtClean="0">
+                                  <a:latin typeface="Cambria Math" panose="02040503050406030204" pitchFamily="18" charset="0"/>
+                                </a:rPr>
+                                <m:t>𝑥</m:t>
+                              </m:r>
+                            </m:e>
+                          </m:d>
+                        </m:e>
+                      </m:func>
+                      <m:r>
+                        <a:rPr lang="en-US" altLang="zh-CN" sz="2800" b="0" i="1" smtClean="0">
+                          <a:latin typeface="Cambria Math" panose="02040503050406030204" pitchFamily="18" charset="0"/>
+                        </a:rPr>
+                        <m:t>−</m:t>
+                      </m:r>
+                      <m:r>
+                        <a:rPr lang="en-US" altLang="zh-CN" sz="2800" b="0" i="1" smtClean="0">
+                          <a:latin typeface="Cambria Math" panose="02040503050406030204" pitchFamily="18" charset="0"/>
+                        </a:rPr>
+                        <m:t>𝜔</m:t>
+                      </m:r>
+                      <m:r>
+                        <a:rPr lang="en-US" altLang="zh-CN" sz="2800" b="0" i="1" smtClean="0">
+                          <a:latin typeface="Cambria Math" panose="02040503050406030204" pitchFamily="18" charset="0"/>
+                        </a:rPr>
+                        <m:t>),</m:t>
+                      </m:r>
+                      <m:rad>
+                        <m:radPr>
+                          <m:degHide m:val="on"/>
+                          <m:ctrlPr>
+                            <a:rPr lang="en-US" altLang="zh-CN" sz="2800" i="1">
+                              <a:latin typeface="Cambria Math" panose="02040503050406030204" pitchFamily="18" charset="0"/>
+                            </a:rPr>
+                          </m:ctrlPr>
+                        </m:radPr>
+                        <m:deg/>
+                        <m:e>
+                          <m:sSubSup>
+                            <m:sSubSupPr>
+                              <m:ctrlPr>
+                                <a:rPr lang="en-US" altLang="zh-CN" sz="2800" i="1">
+                                  <a:latin typeface="Cambria Math" panose="02040503050406030204" pitchFamily="18" charset="0"/>
+                                </a:rPr>
+                              </m:ctrlPr>
+                            </m:sSubSupPr>
+                            <m:e>
+                              <m:r>
+                                <a:rPr lang="en-US" altLang="zh-CN" sz="2800" i="1">
+                                  <a:latin typeface="Cambria Math" panose="02040503050406030204" pitchFamily="18" charset="0"/>
+                                </a:rPr>
+                                <m:t>𝑥</m:t>
+                              </m:r>
+                            </m:e>
+                            <m:sub>
+                              <m:r>
+                                <a:rPr lang="en-US" altLang="zh-CN" sz="2800" i="1">
+                                  <a:latin typeface="Cambria Math" panose="02040503050406030204" pitchFamily="18" charset="0"/>
+                                </a:rPr>
+                                <m:t>0</m:t>
+                              </m:r>
+                            </m:sub>
+                            <m:sup>
+                              <m:r>
+                                <a:rPr lang="en-US" altLang="zh-CN" sz="2800" i="1">
+                                  <a:latin typeface="Cambria Math" panose="02040503050406030204" pitchFamily="18" charset="0"/>
+                                </a:rPr>
+                                <m:t>2</m:t>
+                              </m:r>
+                            </m:sup>
+                          </m:sSubSup>
+                          <m:r>
+                            <a:rPr lang="en-US" altLang="zh-CN" sz="2800" i="1">
+                              <a:latin typeface="Cambria Math" panose="02040503050406030204" pitchFamily="18" charset="0"/>
+                            </a:rPr>
+                            <m:t>+</m:t>
+                          </m:r>
+                          <m:sSubSup>
+                            <m:sSubSupPr>
+                              <m:ctrlPr>
+                                <a:rPr lang="en-US" altLang="zh-CN" sz="2800" i="1">
+                                  <a:latin typeface="Cambria Math" panose="02040503050406030204" pitchFamily="18" charset="0"/>
+                                </a:rPr>
+                              </m:ctrlPr>
+                            </m:sSubSupPr>
+                            <m:e>
+                              <m:r>
+                                <a:rPr lang="en-US" altLang="zh-CN" sz="2800" i="1">
+                                  <a:latin typeface="Cambria Math" panose="02040503050406030204" pitchFamily="18" charset="0"/>
+                                </a:rPr>
+                                <m:t>𝑥</m:t>
+                              </m:r>
+                            </m:e>
+                            <m:sub>
+                              <m:r>
+                                <a:rPr lang="en-US" altLang="zh-CN" sz="2800" i="1">
+                                  <a:latin typeface="Cambria Math" panose="02040503050406030204" pitchFamily="18" charset="0"/>
+                                </a:rPr>
+                                <m:t>1</m:t>
+                              </m:r>
+                            </m:sub>
+                            <m:sup>
+                              <m:r>
+                                <a:rPr lang="en-US" altLang="zh-CN" sz="2800" i="1">
+                                  <a:latin typeface="Cambria Math" panose="02040503050406030204" pitchFamily="18" charset="0"/>
+                                </a:rPr>
+                                <m:t>2</m:t>
+                              </m:r>
+                            </m:sup>
+                          </m:sSubSup>
+                        </m:e>
+                      </m:rad>
+                      <m:r>
+                        <m:rPr>
+                          <m:sty m:val="p"/>
+                        </m:rPr>
+                        <a:rPr lang="en-US" altLang="zh-CN" sz="2800" b="0" i="0" smtClean="0">
+                          <a:latin typeface="Cambria Math" panose="02040503050406030204" pitchFamily="18" charset="0"/>
+                        </a:rPr>
+                        <m:t>sin</m:t>
+                      </m:r>
+                      <m:r>
+                        <a:rPr lang="en-US" altLang="zh-CN" sz="2800" b="0" i="1" smtClean="0">
+                          <a:latin typeface="Cambria Math" panose="02040503050406030204" pitchFamily="18" charset="0"/>
+                        </a:rPr>
+                        <m:t>⁡(</m:t>
+                      </m:r>
+                      <m:func>
+                        <m:funcPr>
+                          <m:ctrlPr>
+                            <a:rPr lang="en-US" altLang="zh-CN" sz="2800" i="1">
+                              <a:latin typeface="Cambria Math" panose="02040503050406030204" pitchFamily="18" charset="0"/>
+                            </a:rPr>
+                          </m:ctrlPr>
+                        </m:funcPr>
+                        <m:fName>
+                          <m:r>
+                            <m:rPr>
+                              <m:sty m:val="p"/>
+                            </m:rPr>
+                            <a:rPr lang="en-US" altLang="zh-CN" sz="2800">
+                              <a:latin typeface="Cambria Math" panose="02040503050406030204" pitchFamily="18" charset="0"/>
+                            </a:rPr>
+                            <m:t>arctan</m:t>
+                          </m:r>
+                        </m:fName>
+                        <m:e>
+                          <m:d>
+                            <m:dPr>
+                              <m:ctrlPr>
+                                <a:rPr lang="en-US" altLang="zh-CN" sz="2800" i="1">
+                                  <a:latin typeface="Cambria Math" panose="02040503050406030204" pitchFamily="18" charset="0"/>
+                                </a:rPr>
+                              </m:ctrlPr>
+                            </m:dPr>
+                            <m:e>
+                              <m:r>
+                                <a:rPr lang="en-US" altLang="zh-CN" sz="2800" i="1">
+                                  <a:latin typeface="Cambria Math" panose="02040503050406030204" pitchFamily="18" charset="0"/>
+                                </a:rPr>
+                                <m:t>𝑦</m:t>
+                              </m:r>
+                              <m:r>
+                                <a:rPr lang="en-US" altLang="zh-CN" sz="2800" i="1">
+                                  <a:latin typeface="Cambria Math" panose="02040503050406030204" pitchFamily="18" charset="0"/>
+                                </a:rPr>
+                                <m:t>,</m:t>
+                              </m:r>
+                              <m:r>
+                                <a:rPr lang="en-US" altLang="zh-CN" sz="2800" i="1">
+                                  <a:latin typeface="Cambria Math" panose="02040503050406030204" pitchFamily="18" charset="0"/>
+                                </a:rPr>
+                                <m:t>𝑥</m:t>
+                              </m:r>
+                            </m:e>
+                          </m:d>
+                        </m:e>
+                      </m:func>
+                      <m:r>
+                        <a:rPr lang="en-US" altLang="zh-CN" sz="2800" i="1">
+                          <a:latin typeface="Cambria Math" panose="02040503050406030204" pitchFamily="18" charset="0"/>
+                        </a:rPr>
+                        <m:t>−</m:t>
+                      </m:r>
+                      <m:r>
+                        <a:rPr lang="en-US" altLang="zh-CN" sz="2800" i="1">
+                          <a:latin typeface="Cambria Math" panose="02040503050406030204" pitchFamily="18" charset="0"/>
+                        </a:rPr>
+                        <m:t>𝜔</m:t>
+                      </m:r>
+                      <m:r>
+                        <a:rPr lang="en-US" altLang="zh-CN" sz="2800" i="1">
+                          <a:latin typeface="Cambria Math" panose="02040503050406030204" pitchFamily="18" charset="0"/>
+                        </a:rPr>
+                        <m:t>),</m:t>
+                      </m:r>
+                      <m:sSub>
+                        <m:sSubPr>
+                          <m:ctrlPr>
+                            <a:rPr lang="en-US" altLang="zh-CN" sz="2800" b="0" i="1" smtClean="0">
+                              <a:latin typeface="Cambria Math" panose="02040503050406030204" pitchFamily="18" charset="0"/>
+                            </a:rPr>
+                          </m:ctrlPr>
+                        </m:sSubPr>
+                        <m:e>
+                          <m:r>
+                            <a:rPr lang="en-US" altLang="zh-CN" sz="2800" b="0" i="1" smtClean="0">
+                              <a:latin typeface="Cambria Math" panose="02040503050406030204" pitchFamily="18" charset="0"/>
+                            </a:rPr>
+                            <m:t>𝑥</m:t>
+                          </m:r>
+                        </m:e>
+                        <m:sub>
+                          <m:r>
+                            <a:rPr lang="en-US" altLang="zh-CN" sz="2800" b="0" i="1" smtClean="0">
+                              <a:latin typeface="Cambria Math" panose="02040503050406030204" pitchFamily="18" charset="0"/>
+                            </a:rPr>
+                            <m:t>2</m:t>
+                          </m:r>
+                        </m:sub>
+                      </m:sSub>
+                      <m:r>
+                        <a:rPr lang="en-US" altLang="zh-CN" sz="2800" b="0" i="1" smtClean="0">
+                          <a:latin typeface="Cambria Math" panose="02040503050406030204" pitchFamily="18" charset="0"/>
+                        </a:rPr>
+                        <m:t>−</m:t>
+                      </m:r>
+                      <m:r>
+                        <a:rPr lang="en-US" altLang="zh-CN" sz="2800" b="0" i="1" smtClean="0">
+                          <a:latin typeface="Cambria Math" panose="02040503050406030204" pitchFamily="18" charset="0"/>
+                        </a:rPr>
+                        <m:t>𝜔</m:t>
+                      </m:r>
+                      <m:r>
+                        <a:rPr lang="en-US" altLang="zh-CN" sz="2800" b="0" i="1" smtClean="0">
+                          <a:latin typeface="Cambria Math" panose="02040503050406030204" pitchFamily="18" charset="0"/>
+                        </a:rPr>
+                        <m:t>]</m:t>
+                      </m:r>
+                    </m:oMath>
+                  </m:oMathPara>
+                </a14:m>
+                <a:endParaRPr lang="en-US" altLang="zh-CN" sz="2800" dirty="0" smtClean="0"/>
+              </a:p>
+              <a:p>
+                <a:pPr marL="0" indent="0">
+                  <a:buNone/>
+                </a:pPr>
+                <a14:m>
+                  <m:oMath xmlns:m="http://schemas.openxmlformats.org/officeDocument/2006/math">
+                    <m:r>
+                      <a:rPr lang="en-US" altLang="zh-CN" sz="3200" b="0" i="1" smtClean="0">
+                        <a:latin typeface="Cambria Math" panose="02040503050406030204" pitchFamily="18" charset="0"/>
+                      </a:rPr>
+                      <m:t>𝜔</m:t>
+                    </m:r>
+                  </m:oMath>
+                </a14:m>
+                <a:r>
+                  <a:rPr lang="zh-CN" altLang="en-US" sz="3200" dirty="0" smtClean="0"/>
+                  <a:t> </a:t>
+                </a:r>
+                <a:r>
+                  <a:rPr lang="en-US" altLang="zh-CN" sz="3200" dirty="0" smtClean="0"/>
+                  <a:t>is given by </a:t>
+                </a:r>
+                <a14:m>
+                  <m:oMath xmlns:m="http://schemas.openxmlformats.org/officeDocument/2006/math">
+                    <m:r>
+                      <m:rPr>
+                        <m:sty m:val="p"/>
+                      </m:rPr>
+                      <a:rPr lang="en-US" altLang="zh-CN" sz="3200" b="0" i="0" smtClean="0">
+                        <a:latin typeface="Cambria Math" panose="02040503050406030204" pitchFamily="18" charset="0"/>
+                      </a:rPr>
+                      <m:t>arctan</m:t>
+                    </m:r>
+                    <m:r>
+                      <a:rPr lang="en-US" altLang="zh-CN" sz="3200" b="0" i="1" smtClean="0">
+                        <a:latin typeface="Cambria Math" panose="02040503050406030204" pitchFamily="18" charset="0"/>
+                      </a:rPr>
+                      <m:t>⁡(</m:t>
+                    </m:r>
+                    <m:sSub>
+                      <m:sSubPr>
+                        <m:ctrlPr>
+                          <a:rPr lang="en-US" altLang="zh-CN" sz="3200" b="0" i="1" smtClean="0">
+                            <a:latin typeface="Cambria Math" panose="02040503050406030204" pitchFamily="18" charset="0"/>
+                          </a:rPr>
+                        </m:ctrlPr>
+                      </m:sSubPr>
+                      <m:e>
+                        <m:r>
+                          <a:rPr lang="en-US" altLang="zh-CN" sz="3200" b="0" i="1" smtClean="0">
+                            <a:latin typeface="Cambria Math" panose="02040503050406030204" pitchFamily="18" charset="0"/>
+                          </a:rPr>
+                          <m:t>𝑝</m:t>
+                        </m:r>
+                      </m:e>
+                      <m:sub>
+                        <m:r>
+                          <a:rPr lang="en-US" altLang="zh-CN" sz="3200" b="0" i="1" smtClean="0">
+                            <a:latin typeface="Cambria Math" panose="02040503050406030204" pitchFamily="18" charset="0"/>
+                          </a:rPr>
+                          <m:t>3</m:t>
+                        </m:r>
+                      </m:sub>
+                    </m:sSub>
+                    <m:r>
+                      <a:rPr lang="en-US" altLang="zh-CN" sz="3200" b="0" i="1" smtClean="0">
+                        <a:latin typeface="Cambria Math" panose="02040503050406030204" pitchFamily="18" charset="0"/>
+                      </a:rPr>
+                      <m:t>−</m:t>
+                    </m:r>
+                    <m:sSub>
+                      <m:sSubPr>
+                        <m:ctrlPr>
+                          <a:rPr lang="en-US" altLang="zh-CN" sz="3200" b="0" i="1" smtClean="0">
+                            <a:latin typeface="Cambria Math" panose="02040503050406030204" pitchFamily="18" charset="0"/>
+                          </a:rPr>
+                        </m:ctrlPr>
+                      </m:sSubPr>
+                      <m:e>
+                        <m:r>
+                          <a:rPr lang="en-US" altLang="zh-CN" sz="3200" b="0" i="1" smtClean="0">
+                            <a:latin typeface="Cambria Math" panose="02040503050406030204" pitchFamily="18" charset="0"/>
+                          </a:rPr>
+                          <m:t>𝑝</m:t>
+                        </m:r>
+                      </m:e>
+                      <m:sub>
+                        <m:r>
+                          <a:rPr lang="en-US" altLang="zh-CN" sz="3200" b="0" i="1" smtClean="0">
+                            <a:latin typeface="Cambria Math" panose="02040503050406030204" pitchFamily="18" charset="0"/>
+                          </a:rPr>
+                          <m:t>1</m:t>
+                        </m:r>
+                      </m:sub>
+                    </m:sSub>
+                    <m:r>
+                      <a:rPr lang="en-US" altLang="zh-CN" sz="3200" b="0" i="1" smtClean="0">
+                        <a:latin typeface="Cambria Math" panose="02040503050406030204" pitchFamily="18" charset="0"/>
+                      </a:rPr>
+                      <m:t>,</m:t>
+                    </m:r>
+                    <m:sSub>
+                      <m:sSubPr>
+                        <m:ctrlPr>
+                          <a:rPr lang="en-US" altLang="zh-CN" sz="3200" b="0" i="1" smtClean="0">
+                            <a:latin typeface="Cambria Math" panose="02040503050406030204" pitchFamily="18" charset="0"/>
+                          </a:rPr>
+                        </m:ctrlPr>
+                      </m:sSubPr>
+                      <m:e>
+                        <m:r>
+                          <a:rPr lang="en-US" altLang="zh-CN" sz="3200" b="0" i="1" smtClean="0">
+                            <a:latin typeface="Cambria Math" panose="02040503050406030204" pitchFamily="18" charset="0"/>
+                          </a:rPr>
+                          <m:t>𝑝</m:t>
+                        </m:r>
+                      </m:e>
+                      <m:sub>
+                        <m:r>
+                          <a:rPr lang="en-US" altLang="zh-CN" sz="3200" b="0" i="1" smtClean="0">
+                            <a:latin typeface="Cambria Math" panose="02040503050406030204" pitchFamily="18" charset="0"/>
+                          </a:rPr>
+                          <m:t>2</m:t>
+                        </m:r>
+                      </m:sub>
+                    </m:sSub>
+                    <m:r>
+                      <a:rPr lang="en-US" altLang="zh-CN" sz="3200" b="0" i="1" smtClean="0">
+                        <a:latin typeface="Cambria Math" panose="02040503050406030204" pitchFamily="18" charset="0"/>
+                      </a:rPr>
+                      <m:t>−</m:t>
+                    </m:r>
+                    <m:sSub>
+                      <m:sSubPr>
+                        <m:ctrlPr>
+                          <a:rPr lang="en-US" altLang="zh-CN" sz="3200" b="0" i="1" smtClean="0">
+                            <a:latin typeface="Cambria Math" panose="02040503050406030204" pitchFamily="18" charset="0"/>
+                          </a:rPr>
+                        </m:ctrlPr>
+                      </m:sSubPr>
+                      <m:e>
+                        <m:r>
+                          <a:rPr lang="en-US" altLang="zh-CN" sz="3200" b="0" i="1" smtClean="0">
+                            <a:latin typeface="Cambria Math" panose="02040503050406030204" pitchFamily="18" charset="0"/>
+                          </a:rPr>
+                          <m:t>𝑝</m:t>
+                        </m:r>
+                      </m:e>
+                      <m:sub>
+                        <m:r>
+                          <a:rPr lang="en-US" altLang="zh-CN" sz="3200" b="0" i="1" smtClean="0">
+                            <a:latin typeface="Cambria Math" panose="02040503050406030204" pitchFamily="18" charset="0"/>
+                          </a:rPr>
+                          <m:t>0</m:t>
+                        </m:r>
+                      </m:sub>
+                    </m:sSub>
+                    <m:r>
+                      <a:rPr lang="en-US" altLang="zh-CN" sz="3200" b="0" i="1" smtClean="0">
+                        <a:latin typeface="Cambria Math" panose="02040503050406030204" pitchFamily="18" charset="0"/>
+                      </a:rPr>
+                      <m:t>)</m:t>
+                    </m:r>
+                  </m:oMath>
+                </a14:m>
+                <a:endParaRPr lang="zh-CN" altLang="en-US" sz="3200" dirty="0"/>
+              </a:p>
+              <a:p>
+                <a:endParaRPr lang="zh-CN" altLang="en-US" dirty="0"/>
+              </a:p>
+            </p:txBody>
+          </p:sp>
+        </mc:Choice>
+        <mc:Fallback xmlns="">
+          <p:sp>
+            <p:nvSpPr>
+              <p:cNvPr id="2" name="文本占位符 1"/>
+              <p:cNvSpPr>
+                <a:spLocks noGrp="1" noRot="1" noChangeAspect="1" noMove="1" noResize="1" noEditPoints="1" noAdjustHandles="1" noChangeArrowheads="1" noChangeShapeType="1" noTextEdit="1"/>
+              </p:cNvSpPr>
+              <p:nvPr>
+                <p:ph type="body" sz="quarter" idx="12"/>
+              </p:nvPr>
+            </p:nvSpPr>
+            <p:spPr>
+              <a:blipFill rotWithShape="0">
+                <a:blip r:embed="rId2"/>
+                <a:stretch>
+                  <a:fillRect t="-1559"/>
+                </a:stretch>
+              </a:blipFill>
+            </p:spPr>
+            <p:txBody>
+              <a:bodyPr/>
+              <a:lstStyle/>
+              <a:p>
+                <a:r>
+                  <a:rPr lang="zh-CN" altLang="en-US">
+                    <a:noFill/>
+                  </a:rPr>
+                  <a:t> </a:t>
+                </a:r>
+              </a:p>
+            </p:txBody>
+          </p:sp>
+        </mc:Fallback>
+      </mc:AlternateContent>
+      <p:sp>
+        <p:nvSpPr>
+          <p:cNvPr id="3" name="文本占位符 2"/>
+          <p:cNvSpPr>
+            <a:spLocks noGrp="1"/>
+          </p:cNvSpPr>
+          <p:nvPr>
+            <p:ph type="body" sz="quarter" idx="10"/>
+          </p:nvPr>
+        </p:nvSpPr>
+        <p:spPr>
+          <a:xfrm>
+            <a:off x="357652" y="748530"/>
+            <a:ext cx="13206974" cy="726801"/>
+          </a:xfrm>
+        </p:spPr>
+        <p:txBody>
+          <a:bodyPr/>
+          <a:lstStyle/>
+          <a:p>
+            <a:r>
+              <a:rPr lang="en-US" altLang="zh-CN" dirty="0" smtClean="0"/>
+              <a:t>Symmetry </a:t>
+            </a:r>
+            <a:r>
+              <a:rPr lang="en-US" altLang="zh-CN" smtClean="0"/>
+              <a:t>of system</a:t>
+            </a:r>
+            <a:endParaRPr lang="zh-CN" altLang="en-US" dirty="0"/>
+          </a:p>
+          <a:p>
+            <a:endParaRPr lang="zh-CN" altLang="en-US" dirty="0"/>
+          </a:p>
+        </p:txBody>
+      </p:sp>
+      <p:sp>
+        <p:nvSpPr>
+          <p:cNvPr id="4" name="灯片编号占位符 3"/>
+          <p:cNvSpPr>
+            <a:spLocks noGrp="1"/>
+          </p:cNvSpPr>
+          <p:nvPr>
+            <p:ph type="sldNum" sz="quarter" idx="4"/>
+          </p:nvPr>
+        </p:nvSpPr>
+        <p:spPr/>
+        <p:txBody>
+          <a:bodyPr/>
+          <a:lstStyle/>
+          <a:p>
+            <a:fld id="{7DAA0FC6-F71F-4650-BE21-9A15F164E712}" type="slidenum">
+              <a:rPr lang="en-US" smtClean="0"/>
+              <a:pPr/>
+              <a:t>6</a:t>
+            </a:fld>
+            <a:endParaRPr lang="en-US" dirty="0"/>
+          </a:p>
+        </p:txBody>
+      </p:sp>
+    </p:spTree>
+    <p:extLst>
+      <p:ext uri="{BB962C8B-B14F-4D97-AF65-F5344CB8AC3E}">
+        <p14:creationId xmlns:p14="http://schemas.microsoft.com/office/powerpoint/2010/main" val="2804770088"/>
+      </p:ext>
+    </p:extLst>
+  </p:cSld>
+  <p:clrMapOvr>
+    <a:masterClrMapping/>
+  </p:clrMapOvr>
+</p:sld>
+</file>
+
+<file path=ppt/slides/slide7.xml><?xml version="1.0" encoding="utf-8"?>
+<p:sld xmlns:a="http://schemas.openxmlformats.org/drawingml/2006/main" xmlns:r="http://schemas.openxmlformats.org/officeDocument/2006/relationships" xmlns:p="http://schemas.openxmlformats.org/presentationml/2006/main">
+  <p:cSld>
+    <p:spTree>
+      <p:nvGrpSpPr>
+        <p:cNvPr id="1" name=""/>
+        <p:cNvGrpSpPr/>
+        <p:nvPr/>
+      </p:nvGrpSpPr>
+      <p:grpSpPr>
+        <a:xfrm>
+          <a:off x="0" y="0"/>
+          <a:ext cx="0" cy="0"/>
+          <a:chOff x="0" y="0"/>
+          <a:chExt cx="0" cy="0"/>
+        </a:xfrm>
+      </p:grpSpPr>
+      <mc:AlternateContent xmlns:mc="http://schemas.openxmlformats.org/markup-compatibility/2006" xmlns:a14="http://schemas.microsoft.com/office/drawing/2010/main">
+        <mc:Choice Requires="a14">
+          <p:sp>
+            <p:nvSpPr>
+              <p:cNvPr id="2" name="文本占位符 1"/>
+              <p:cNvSpPr>
+                <a:spLocks noGrp="1"/>
+              </p:cNvSpPr>
+              <p:nvPr>
+                <p:ph type="body" sz="quarter" idx="12"/>
+              </p:nvPr>
+            </p:nvSpPr>
+            <p:spPr>
+              <a:xfrm>
+                <a:off x="575733" y="1642631"/>
+                <a:ext cx="12701026" cy="5082540"/>
+              </a:xfrm>
+            </p:spPr>
+            <p:txBody>
+              <a:bodyPr/>
+              <a:lstStyle/>
+              <a:p>
+                <a:r>
+                  <a:rPr lang="en-US" altLang="zh-CN" dirty="0" err="1" smtClean="0"/>
+                  <a:t>Alg</a:t>
+                </a:r>
+                <a:r>
+                  <a:rPr lang="en-US" altLang="zh-CN" dirty="0" smtClean="0"/>
+                  <a:t> (</a:t>
+                </a:r>
+                <a:r>
+                  <a:rPr lang="en-US" altLang="zh-CN" dirty="0" err="1" smtClean="0"/>
+                  <a:t>initial_disc</a:t>
+                </a:r>
+                <a:r>
+                  <a:rPr lang="en-US" altLang="zh-CN" dirty="0" smtClean="0"/>
+                  <a:t>, </a:t>
+                </a:r>
+                <a:r>
+                  <a:rPr lang="en-US" altLang="zh-CN" dirty="0" err="1" smtClean="0"/>
+                  <a:t>initial_set,n</a:t>
+                </a:r>
+                <a:r>
+                  <a:rPr lang="en-US" altLang="zh-CN" dirty="0" smtClean="0"/>
+                  <a:t>):</a:t>
+                </a:r>
+              </a:p>
+              <a:p>
+                <a:pPr lvl="1"/>
+                <a:r>
+                  <a:rPr lang="en-US" altLang="zh-CN" dirty="0" smtClean="0"/>
+                  <a:t>Assume initial discrepancy function</a:t>
+                </a:r>
+              </a:p>
+              <a:p>
+                <a:pPr lvl="1"/>
+                <a:r>
+                  <a:rPr lang="en-US" altLang="zh-CN" dirty="0" smtClean="0"/>
+                  <a:t>Do random sample to get </a:t>
+                </a:r>
+                <a14:m>
+                  <m:oMath xmlns:m="http://schemas.openxmlformats.org/officeDocument/2006/math">
+                    <m:r>
+                      <a:rPr lang="en-US" altLang="zh-CN" b="0" i="1" smtClean="0">
+                        <a:latin typeface="Cambria Math" panose="02040503050406030204" pitchFamily="18" charset="0"/>
+                      </a:rPr>
+                      <m:t>𝑥</m:t>
+                    </m:r>
+                    <m:r>
+                      <a:rPr lang="en-US" altLang="zh-CN" b="0" i="1" smtClean="0">
+                        <a:latin typeface="Cambria Math" panose="02040503050406030204" pitchFamily="18" charset="0"/>
+                      </a:rPr>
+                      <m:t>(</m:t>
+                    </m:r>
+                    <m:r>
+                      <a:rPr lang="en-US" altLang="zh-CN" b="0" i="1" smtClean="0">
+                        <a:latin typeface="Cambria Math" panose="02040503050406030204" pitchFamily="18" charset="0"/>
+                      </a:rPr>
+                      <m:t>𝑡</m:t>
+                    </m:r>
+                    <m:r>
+                      <a:rPr lang="en-US" altLang="zh-CN" b="0" i="1" smtClean="0">
+                        <a:latin typeface="Cambria Math" panose="02040503050406030204" pitchFamily="18" charset="0"/>
+                      </a:rPr>
+                      <m:t>)</m:t>
+                    </m:r>
+                  </m:oMath>
+                </a14:m>
+                <a:r>
+                  <a:rPr lang="zh-CN" altLang="en-US" dirty="0" smtClean="0"/>
+                  <a:t> </a:t>
+                </a:r>
+                <a:r>
+                  <a:rPr lang="en-US" altLang="zh-CN" dirty="0" smtClean="0"/>
+                  <a:t>according to discrepancy function</a:t>
+                </a:r>
+              </a:p>
+              <a:p>
+                <a:pPr lvl="1"/>
+                <a:r>
+                  <a:rPr lang="en-US" altLang="zh-CN" dirty="0" smtClean="0"/>
+                  <a:t>For I in range(n)</a:t>
+                </a:r>
+              </a:p>
+              <a:p>
+                <a:pPr lvl="2"/>
+                <a:r>
+                  <a:rPr lang="en-US" altLang="zh-CN" dirty="0" smtClean="0"/>
+                  <a:t>Train g</a:t>
+                </a:r>
+              </a:p>
+              <a:p>
+                <a:pPr lvl="2"/>
+                <a:r>
+                  <a:rPr lang="en-US" altLang="zh-CN" dirty="0" smtClean="0"/>
+                  <a:t>With trained g, perform simulation from </a:t>
+                </a:r>
+                <a:r>
+                  <a:rPr lang="en-US" altLang="zh-CN" dirty="0" err="1" smtClean="0"/>
+                  <a:t>initial_set</a:t>
+                </a:r>
+                <a:r>
+                  <a:rPr lang="en-US" altLang="zh-CN" dirty="0" smtClean="0"/>
+                  <a:t> to get set of trajectory </a:t>
+                </a:r>
+                <a14:m>
+                  <m:oMath xmlns:m="http://schemas.openxmlformats.org/officeDocument/2006/math">
+                    <m:r>
+                      <a:rPr lang="en-US" altLang="zh-CN" b="0" i="1" smtClean="0">
+                        <a:latin typeface="Cambria Math" panose="02040503050406030204" pitchFamily="18" charset="0"/>
+                      </a:rPr>
+                      <m:t>𝑡𝑟𝑎𝑗</m:t>
+                    </m:r>
+                  </m:oMath>
+                </a14:m>
+                <a:endParaRPr lang="en-US" altLang="zh-CN" dirty="0" smtClean="0"/>
+              </a:p>
+              <a:p>
+                <a:pPr lvl="2"/>
+                <a:r>
+                  <a:rPr lang="en-US" altLang="zh-CN" dirty="0" smtClean="0"/>
+                  <a:t>With </a:t>
+                </a:r>
+                <a14:m>
+                  <m:oMath xmlns:m="http://schemas.openxmlformats.org/officeDocument/2006/math">
+                    <m:r>
+                      <a:rPr lang="en-US" altLang="zh-CN" b="0" i="1" smtClean="0">
+                        <a:latin typeface="Cambria Math" panose="02040503050406030204" pitchFamily="18" charset="0"/>
+                      </a:rPr>
+                      <m:t>𝑡𝑟𝑎𝑗</m:t>
+                    </m:r>
+                  </m:oMath>
+                </a14:m>
+                <a:r>
+                  <a:rPr lang="en-US" altLang="zh-CN" dirty="0" smtClean="0"/>
+                  <a:t>, train h</a:t>
+                </a:r>
+              </a:p>
+              <a:p>
+                <a:pPr lvl="2"/>
+                <a:r>
+                  <a:rPr lang="en-US" altLang="zh-CN" dirty="0" smtClean="0"/>
+                  <a:t>Perform simulation with g and h, find counter example that violates h, append to training data</a:t>
+                </a:r>
+                <a:endParaRPr lang="zh-CN" altLang="en-US" dirty="0"/>
+              </a:p>
+            </p:txBody>
+          </p:sp>
+        </mc:Choice>
+        <mc:Fallback xmlns="">
+          <p:sp>
+            <p:nvSpPr>
+              <p:cNvPr id="2" name="文本占位符 1"/>
+              <p:cNvSpPr>
+                <a:spLocks noGrp="1" noRot="1" noChangeAspect="1" noMove="1" noResize="1" noEditPoints="1" noAdjustHandles="1" noChangeArrowheads="1" noChangeShapeType="1" noTextEdit="1"/>
+              </p:cNvSpPr>
+              <p:nvPr>
+                <p:ph type="body" sz="quarter" idx="12"/>
+              </p:nvPr>
+            </p:nvSpPr>
+            <p:spPr>
+              <a:xfrm>
+                <a:off x="575733" y="1642631"/>
+                <a:ext cx="12701026" cy="5082540"/>
+              </a:xfrm>
+              <a:blipFill rotWithShape="0">
+                <a:blip r:embed="rId2"/>
+                <a:stretch>
+                  <a:fillRect l="-1296" t="-1799" b="-4317"/>
+                </a:stretch>
+              </a:blipFill>
+            </p:spPr>
+            <p:txBody>
+              <a:bodyPr/>
+              <a:lstStyle/>
+              <a:p>
+                <a:r>
+                  <a:rPr lang="zh-CN" altLang="en-US">
+                    <a:noFill/>
+                  </a:rPr>
+                  <a:t> </a:t>
+                </a:r>
+              </a:p>
+            </p:txBody>
+          </p:sp>
+        </mc:Fallback>
+      </mc:AlternateContent>
+      <p:sp>
+        <p:nvSpPr>
+          <p:cNvPr id="3" name="文本占位符 2"/>
+          <p:cNvSpPr>
+            <a:spLocks noGrp="1"/>
+          </p:cNvSpPr>
+          <p:nvPr>
+            <p:ph type="body" sz="quarter" idx="10"/>
+          </p:nvPr>
+        </p:nvSpPr>
+        <p:spPr/>
+        <p:txBody>
+          <a:bodyPr/>
+          <a:lstStyle/>
+          <a:p>
+            <a:endParaRPr lang="zh-CN" altLang="en-US"/>
+          </a:p>
+        </p:txBody>
+      </p:sp>
+      <p:sp>
+        <p:nvSpPr>
+          <p:cNvPr id="4" name="灯片编号占位符 3"/>
+          <p:cNvSpPr>
+            <a:spLocks noGrp="1"/>
+          </p:cNvSpPr>
+          <p:nvPr>
+            <p:ph type="sldNum" sz="quarter" idx="4"/>
+          </p:nvPr>
+        </p:nvSpPr>
+        <p:spPr/>
+        <p:txBody>
+          <a:bodyPr/>
+          <a:lstStyle/>
+          <a:p>
+            <a:fld id="{7DAA0FC6-F71F-4650-BE21-9A15F164E712}" type="slidenum">
+              <a:rPr lang="en-US" smtClean="0"/>
+              <a:pPr/>
+              <a:t>7</a:t>
+            </a:fld>
+            <a:endParaRPr lang="en-US" dirty="0"/>
+          </a:p>
+        </p:txBody>
+      </p:sp>
+    </p:spTree>
+    <p:extLst>
+      <p:ext uri="{BB962C8B-B14F-4D97-AF65-F5344CB8AC3E}">
+        <p14:creationId xmlns:p14="http://schemas.microsoft.com/office/powerpoint/2010/main" val="2507331014"/>
+      </p:ext>
+    </p:extLst>
+  </p:cSld>
+  <p:clrMapOvr>
+    <a:masterClrMapping/>
+  </p:clrMapOvr>
+</p:sld>
+</file>
+
+<file path=ppt/slides/slide8.xml><?xml version="1.0" encoding="utf-8"?>
+<p:sld xmlns:a="http://schemas.openxmlformats.org/drawingml/2006/main" xmlns:r="http://schemas.openxmlformats.org/officeDocument/2006/relationships" xmlns:p="http://schemas.openxmlformats.org/presentationml/2006/main">
+  <p:cSld>
+    <p:spTree>
+      <p:nvGrpSpPr>
+        <p:cNvPr id="1" name=""/>
+        <p:cNvGrpSpPr/>
+        <p:nvPr/>
+      </p:nvGrpSpPr>
+      <p:grpSpPr>
+        <a:xfrm>
+          <a:off x="0" y="0"/>
+          <a:ext cx="0" cy="0"/>
+          <a:chOff x="0" y="0"/>
+          <a:chExt cx="0" cy="0"/>
+        </a:xfrm>
+      </p:grpSpPr>
+      <mc:AlternateContent xmlns:mc="http://schemas.openxmlformats.org/markup-compatibility/2006" xmlns:a14="http://schemas.microsoft.com/office/drawing/2010/main">
+        <mc:Choice Requires="a14">
           <p:sp>
             <p:nvSpPr>
               <p:cNvPr id="2" name="文本占位符 1"/>
@@ -4361,11 +7370,7 @@
                 <a:pPr algn="just"/>
                 <a:r>
                   <a:rPr lang="en-US" altLang="zh-CN" sz="2400" dirty="0" smtClean="0"/>
-                  <a:t>The outp</a:t>
-                </a:r>
-                <a:r>
-                  <a:rPr lang="en-US" altLang="zh-CN" sz="2400" dirty="0" smtClean="0"/>
-                  <a:t>ut from the neural network is the output of the controller, which is the steering angle </a:t>
+                  <a:t>The output from the neural network is the output of the controller, which is the steering angle </a:t>
                 </a:r>
                 <a14:m>
                   <m:oMath xmlns:m="http://schemas.openxmlformats.org/officeDocument/2006/math">
@@ -4401,7 +7406,7 @@
             </p:txBody>
           </p:sp>
         </mc:Choice>
-        <mc:Fallback>
+        <mc:Fallback xmlns="">
           <p:sp>
             <p:nvSpPr>
               <p:cNvPr id="2" name="文本占位符 1"/>
@@ -4476,7 +7481,7 @@
             <a:fld id="{7DAA0FC6-F71F-4650-BE21-9A15F164E712}" type="slidenum">
               <a:rPr lang="en-US" smtClean="0"/>
               <a:pPr/>
-              <a:t>5</a:t>
+              <a:t>8</a:t>
             </a:fld>
             <a:endParaRPr lang="en-US" dirty="0"/>
           </a:p>
@@ -4495,7 +7500,7 @@
 </p:sld>
 </file>
 
-<file path=ppt/slides/slide6.xml><?xml version="1.0" encoding="utf-8"?>
+<file path=ppt/slides/slide9.xml><?xml version="1.0" encoding="utf-8"?>
 <p:sld xmlns:a="http://schemas.openxmlformats.org/drawingml/2006/main" xmlns:r="http://schemas.openxmlformats.org/officeDocument/2006/relationships" xmlns:p="http://schemas.openxmlformats.org/presentationml/2006/main">
   <p:cSld>
     <p:spTree>
@@ -4670,7 +7675,7 @@
             <a:fld id="{7DAA0FC6-F71F-4650-BE21-9A15F164E712}" type="slidenum">
               <a:rPr lang="en-US" smtClean="0"/>
               <a:pPr/>
-              <a:t>6</a:t>
+              <a:t>9</a:t>
             </a:fld>
             <a:endParaRPr lang="en-US" dirty="0"/>
           </a:p>
@@ -4740,504 +7745,6 @@
     <p:extLst>
       <p:ext uri="{BB962C8B-B14F-4D97-AF65-F5344CB8AC3E}">
         <p14:creationId xmlns:p14="http://schemas.microsoft.com/office/powerpoint/2010/main" val="4034413336"/>
-      </p:ext>
-    </p:extLst>
-  </p:cSld>
-  <p:clrMapOvr>
-    <a:masterClrMapping/>
-  </p:clrMapOvr>
-</p:sld>
-</file>
-
-<file path=ppt/slides/slide7.xml><?xml version="1.0" encoding="utf-8"?>
-<p:sld xmlns:a="http://schemas.openxmlformats.org/drawingml/2006/main" xmlns:r="http://schemas.openxmlformats.org/officeDocument/2006/relationships" xmlns:p="http://schemas.openxmlformats.org/presentationml/2006/main">
-  <p:cSld>
-    <p:spTree>
-      <p:nvGrpSpPr>
-        <p:cNvPr id="1" name=""/>
-        <p:cNvGrpSpPr/>
-        <p:nvPr/>
-      </p:nvGrpSpPr>
-      <p:grpSpPr>
-        <a:xfrm>
-          <a:off x="0" y="0"/>
-          <a:ext cx="0" cy="0"/>
-          <a:chOff x="0" y="0"/>
-          <a:chExt cx="0" cy="0"/>
-        </a:xfrm>
-      </p:grpSpPr>
-      <mc:AlternateContent xmlns:mc="http://schemas.openxmlformats.org/markup-compatibility/2006">
-        <mc:Choice xmlns:a14="http://schemas.microsoft.com/office/drawing/2010/main" Requires="a14">
-          <p:sp>
-            <p:nvSpPr>
-              <p:cNvPr id="2" name="文本占位符 1"/>
-              <p:cNvSpPr>
-                <a:spLocks noGrp="1"/>
-              </p:cNvSpPr>
-              <p:nvPr>
-                <p:ph type="body" sz="quarter" idx="12"/>
-              </p:nvPr>
-            </p:nvSpPr>
-            <p:spPr>
-              <a:xfrm>
-                <a:off x="610626" y="1633220"/>
-                <a:ext cx="12701026" cy="5380644"/>
-              </a:xfrm>
-            </p:spPr>
-            <p:txBody>
-              <a:bodyPr/>
-              <a:lstStyle/>
-              <a:p>
-                <a:pPr algn="just"/>
-                <a:r>
-                  <a:rPr lang="en-US" altLang="zh-CN" sz="2400" dirty="0" smtClean="0"/>
-                  <a:t>The below figures shows the reach tube computed by </a:t>
-                </a:r>
-                <a:r>
-                  <a:rPr lang="en-US" altLang="zh-CN" sz="2400" dirty="0" err="1" smtClean="0"/>
-                  <a:t>DryVR</a:t>
-                </a:r>
-                <a:r>
-                  <a:rPr lang="en-US" altLang="zh-CN" sz="2400" dirty="0" smtClean="0"/>
-                  <a:t> for the vehicle with initial condition </a:t>
-                </a:r>
-                <a14:m>
-                  <m:oMath xmlns:m="http://schemas.openxmlformats.org/officeDocument/2006/math">
-                    <m:r>
-                      <a:rPr lang="en-US" altLang="zh-CN" sz="2400" b="0" i="1" smtClean="0">
-                        <a:latin typeface="Cambria Math" panose="02040503050406030204" pitchFamily="18" charset="0"/>
-                      </a:rPr>
-                      <m:t>−15.05≤</m:t>
-                    </m:r>
-                    <m:r>
-                      <a:rPr lang="en-US" altLang="zh-CN" sz="2400" b="0" i="1" smtClean="0">
-                        <a:latin typeface="Cambria Math" panose="02040503050406030204" pitchFamily="18" charset="0"/>
-                      </a:rPr>
-                      <m:t>𝑥</m:t>
-                    </m:r>
-                    <m:r>
-                      <a:rPr lang="en-US" altLang="zh-CN" sz="2400" b="0" i="1" smtClean="0">
-                        <a:latin typeface="Cambria Math" panose="02040503050406030204" pitchFamily="18" charset="0"/>
-                      </a:rPr>
-                      <m:t>≤−14.05, −0.05≤</m:t>
-                    </m:r>
-                    <m:r>
-                      <a:rPr lang="en-US" altLang="zh-CN" sz="2400" b="0" i="1" smtClean="0">
-                        <a:latin typeface="Cambria Math" panose="02040503050406030204" pitchFamily="18" charset="0"/>
-                      </a:rPr>
-                      <m:t>𝑦</m:t>
-                    </m:r>
-                    <m:r>
-                      <a:rPr lang="en-US" altLang="zh-CN" sz="2400" b="0" i="1" smtClean="0">
-                        <a:latin typeface="Cambria Math" panose="02040503050406030204" pitchFamily="18" charset="0"/>
-                      </a:rPr>
-                      <m:t>≤0.05, −</m:t>
-                    </m:r>
-                    <m:r>
-                      <a:rPr lang="en-US" altLang="zh-CN" sz="2400" b="0" i="1" smtClean="0">
-                        <a:latin typeface="Cambria Math" panose="02040503050406030204" pitchFamily="18" charset="0"/>
-                      </a:rPr>
-                      <m:t>𝜋</m:t>
-                    </m:r>
-                    <m:r>
-                      <a:rPr lang="en-US" altLang="zh-CN" sz="2400" b="0" i="1" smtClean="0">
-                        <a:latin typeface="Cambria Math" panose="02040503050406030204" pitchFamily="18" charset="0"/>
-                      </a:rPr>
-                      <m:t>≤</m:t>
-                    </m:r>
-                    <m:r>
-                      <a:rPr lang="en-US" altLang="zh-CN" sz="2400" b="0" i="1" smtClean="0">
-                        <a:latin typeface="Cambria Math" panose="02040503050406030204" pitchFamily="18" charset="0"/>
-                      </a:rPr>
-                      <m:t>𝜃</m:t>
-                    </m:r>
-                    <m:r>
-                      <a:rPr lang="en-US" altLang="zh-CN" sz="2400" b="0" i="1" smtClean="0">
-                        <a:latin typeface="Cambria Math" panose="02040503050406030204" pitchFamily="18" charset="0"/>
-                      </a:rPr>
-                      <m:t>≤</m:t>
-                    </m:r>
-                    <m:r>
-                      <a:rPr lang="en-US" altLang="zh-CN" sz="2400" b="0" i="1" smtClean="0">
-                        <a:latin typeface="Cambria Math" panose="02040503050406030204" pitchFamily="18" charset="0"/>
-                      </a:rPr>
-                      <m:t>𝜋</m:t>
-                    </m:r>
-                  </m:oMath>
-                </a14:m>
-                <a:r>
-                  <a:rPr lang="en-US" altLang="zh-CN" sz="2400" dirty="0" smtClean="0"/>
-                  <a:t>, where x, y are the position of the vehicle and </a:t>
-                </a:r>
-                <a14:m>
-                  <m:oMath xmlns:m="http://schemas.openxmlformats.org/officeDocument/2006/math">
-                    <m:r>
-                      <a:rPr lang="en-US" altLang="zh-CN" sz="2400" b="0" i="1" smtClean="0">
-                        <a:latin typeface="Cambria Math" panose="02040503050406030204" pitchFamily="18" charset="0"/>
-                      </a:rPr>
-                      <m:t>𝜃</m:t>
-                    </m:r>
-                  </m:oMath>
-                </a14:m>
-                <a:r>
-                  <a:rPr lang="zh-CN" altLang="en-US" sz="2400" dirty="0" smtClean="0"/>
-                  <a:t> </a:t>
-                </a:r>
-                <a:r>
-                  <a:rPr lang="en-US" altLang="zh-CN" sz="2400" dirty="0" smtClean="0"/>
-                  <a:t>is the orientation of the vehicle.</a:t>
-                </a:r>
-              </a:p>
-              <a:p>
-                <a:pPr algn="just"/>
-                <a:endParaRPr lang="en-US" altLang="zh-CN" sz="2400" dirty="0"/>
-              </a:p>
-              <a:p>
-                <a:pPr algn="just"/>
-                <a:endParaRPr lang="en-US" altLang="zh-CN" sz="2400" dirty="0" smtClean="0"/>
-              </a:p>
-              <a:p>
-                <a:pPr algn="just"/>
-                <a:endParaRPr lang="en-US" altLang="zh-CN" sz="2400" dirty="0"/>
-              </a:p>
-              <a:p>
-                <a:pPr algn="just"/>
-                <a:endParaRPr lang="en-US" altLang="zh-CN" sz="2400" dirty="0" smtClean="0"/>
-              </a:p>
-              <a:p>
-                <a:pPr marL="0" indent="0" algn="just">
-                  <a:buNone/>
-                </a:pPr>
-                <a:endParaRPr lang="en-US" altLang="zh-CN" sz="2400" dirty="0" smtClean="0"/>
-              </a:p>
-              <a:p>
-                <a:pPr algn="just"/>
-                <a:endParaRPr lang="en-US" altLang="zh-CN" sz="2400" dirty="0"/>
-              </a:p>
-              <a:p>
-                <a:pPr algn="just"/>
-                <a:r>
-                  <a:rPr lang="en-US" altLang="zh-CN" sz="2400" dirty="0" smtClean="0"/>
-                  <a:t>In the pictures, the reach tube for mode 1 is not plotted since the vehicle will remain stationary in that mode. The red traces in the plot shows random simulation trajectories with the neural network tracking controller. </a:t>
-                </a:r>
-              </a:p>
-              <a:p>
-                <a:pPr algn="just"/>
-                <a:r>
-                  <a:rPr lang="en-US" altLang="zh-CN" sz="2400" dirty="0" smtClean="0"/>
-                  <a:t>The first plot plots time vs x. The second plot plots time vs y. The third plot plots x vs y.  </a:t>
-                </a:r>
-                <a:endParaRPr lang="en-US" altLang="zh-CN" sz="2400" dirty="0"/>
-              </a:p>
-            </p:txBody>
-          </p:sp>
-        </mc:Choice>
-        <mc:Fallback>
-          <p:sp>
-            <p:nvSpPr>
-              <p:cNvPr id="2" name="文本占位符 1"/>
-              <p:cNvSpPr>
-                <a:spLocks noGrp="1" noRot="1" noChangeAspect="1" noMove="1" noResize="1" noEditPoints="1" noAdjustHandles="1" noChangeArrowheads="1" noChangeShapeType="1" noTextEdit="1"/>
-              </p:cNvSpPr>
-              <p:nvPr>
-                <p:ph type="body" sz="quarter" idx="12"/>
-              </p:nvPr>
-            </p:nvSpPr>
-            <p:spPr>
-              <a:xfrm>
-                <a:off x="610626" y="1633220"/>
-                <a:ext cx="12701026" cy="5380644"/>
-              </a:xfrm>
-              <a:blipFill rotWithShape="0">
-                <a:blip r:embed="rId2"/>
-                <a:stretch>
-                  <a:fillRect l="-624" t="-793" r="-720" b="-3624"/>
-                </a:stretch>
-              </a:blipFill>
-            </p:spPr>
-            <p:txBody>
-              <a:bodyPr/>
-              <a:lstStyle/>
-              <a:p>
-                <a:r>
-                  <a:rPr lang="zh-CN" altLang="en-US">
-                    <a:noFill/>
-                  </a:rPr>
-                  <a:t> </a:t>
-                </a:r>
-              </a:p>
-            </p:txBody>
-          </p:sp>
-        </mc:Fallback>
-      </mc:AlternateContent>
-      <p:sp>
-        <p:nvSpPr>
-          <p:cNvPr id="3" name="文本占位符 2"/>
-          <p:cNvSpPr>
-            <a:spLocks noGrp="1"/>
-          </p:cNvSpPr>
-          <p:nvPr>
-            <p:ph type="body" sz="quarter" idx="10"/>
-          </p:nvPr>
-        </p:nvSpPr>
-        <p:spPr/>
-        <p:txBody>
-          <a:bodyPr/>
-          <a:lstStyle/>
-          <a:p>
-            <a:r>
-              <a:rPr lang="en-US" altLang="zh-CN" dirty="0" smtClean="0"/>
-              <a:t>Computed </a:t>
-            </a:r>
-            <a:r>
-              <a:rPr lang="en-US" altLang="zh-CN" dirty="0" err="1" smtClean="0"/>
-              <a:t>Reachtube</a:t>
-            </a:r>
-            <a:r>
-              <a:rPr lang="en-US" altLang="zh-CN" dirty="0" smtClean="0"/>
-              <a:t>	</a:t>
-            </a:r>
-            <a:endParaRPr lang="zh-CN" altLang="en-US" dirty="0"/>
-          </a:p>
-        </p:txBody>
-      </p:sp>
-      <p:sp>
-        <p:nvSpPr>
-          <p:cNvPr id="4" name="灯片编号占位符 3"/>
-          <p:cNvSpPr>
-            <a:spLocks noGrp="1"/>
-          </p:cNvSpPr>
-          <p:nvPr>
-            <p:ph type="sldNum" sz="quarter" idx="4"/>
-          </p:nvPr>
-        </p:nvSpPr>
-        <p:spPr/>
-        <p:txBody>
-          <a:bodyPr/>
-          <a:lstStyle/>
-          <a:p>
-            <a:fld id="{7DAA0FC6-F71F-4650-BE21-9A15F164E712}" type="slidenum">
-              <a:rPr lang="en-US" smtClean="0"/>
-              <a:pPr/>
-              <a:t>7</a:t>
-            </a:fld>
-            <a:endParaRPr lang="en-US" dirty="0"/>
-          </a:p>
-        </p:txBody>
-      </p:sp>
-      <p:pic>
-        <p:nvPicPr>
-          <p:cNvPr id="5" name="图片 4"/>
-          <p:cNvPicPr>
-            <a:picLocks noChangeAspect="1"/>
-          </p:cNvPicPr>
-          <p:nvPr/>
-        </p:nvPicPr>
-        <p:blipFill>
-          <a:blip r:embed="rId3" cstate="print">
-            <a:extLst>
-              <a:ext uri="{28A0092B-C50C-407E-A947-70E740481C1C}">
-                <a14:useLocalDpi xmlns:a14="http://schemas.microsoft.com/office/drawing/2010/main" val="0"/>
-              </a:ext>
-            </a:extLst>
-          </a:blip>
-          <a:stretch>
-            <a:fillRect/>
-          </a:stretch>
-        </p:blipFill>
-        <p:spPr>
-          <a:xfrm>
-            <a:off x="1775078" y="2741771"/>
-            <a:ext cx="3489402" cy="2671893"/>
-          </a:xfrm>
-          <a:prstGeom prst="rect">
-            <a:avLst/>
-          </a:prstGeom>
-        </p:spPr>
-      </p:pic>
-      <p:pic>
-        <p:nvPicPr>
-          <p:cNvPr id="6" name="图片 5"/>
-          <p:cNvPicPr>
-            <a:picLocks noChangeAspect="1"/>
-          </p:cNvPicPr>
-          <p:nvPr/>
-        </p:nvPicPr>
-        <p:blipFill>
-          <a:blip r:embed="rId4" cstate="print">
-            <a:extLst>
-              <a:ext uri="{28A0092B-C50C-407E-A947-70E740481C1C}">
-                <a14:useLocalDpi xmlns:a14="http://schemas.microsoft.com/office/drawing/2010/main" val="0"/>
-              </a:ext>
-            </a:extLst>
-          </a:blip>
-          <a:stretch>
-            <a:fillRect/>
-          </a:stretch>
-        </p:blipFill>
-        <p:spPr>
-          <a:xfrm>
-            <a:off x="5264480" y="2741771"/>
-            <a:ext cx="3489402" cy="2671893"/>
-          </a:xfrm>
-          <a:prstGeom prst="rect">
-            <a:avLst/>
-          </a:prstGeom>
-        </p:spPr>
-      </p:pic>
-      <p:pic>
-        <p:nvPicPr>
-          <p:cNvPr id="7" name="图片 6"/>
-          <p:cNvPicPr>
-            <a:picLocks noChangeAspect="1"/>
-          </p:cNvPicPr>
-          <p:nvPr/>
-        </p:nvPicPr>
-        <p:blipFill>
-          <a:blip r:embed="rId5" cstate="print">
-            <a:extLst>
-              <a:ext uri="{28A0092B-C50C-407E-A947-70E740481C1C}">
-                <a14:useLocalDpi xmlns:a14="http://schemas.microsoft.com/office/drawing/2010/main" val="0"/>
-              </a:ext>
-            </a:extLst>
-          </a:blip>
-          <a:stretch>
-            <a:fillRect/>
-          </a:stretch>
-        </p:blipFill>
-        <p:spPr>
-          <a:xfrm>
-            <a:off x="8753882" y="2741771"/>
-            <a:ext cx="3489402" cy="2671893"/>
-          </a:xfrm>
-          <a:prstGeom prst="rect">
-            <a:avLst/>
-          </a:prstGeom>
-        </p:spPr>
-      </p:pic>
-    </p:spTree>
-    <p:extLst>
-      <p:ext uri="{BB962C8B-B14F-4D97-AF65-F5344CB8AC3E}">
-        <p14:creationId xmlns:p14="http://schemas.microsoft.com/office/powerpoint/2010/main" val="2556702610"/>
-      </p:ext>
-    </p:extLst>
-  </p:cSld>
-  <p:clrMapOvr>
-    <a:masterClrMapping/>
-  </p:clrMapOvr>
-</p:sld>
-</file>
-
-<file path=ppt/slides/slide8.xml><?xml version="1.0" encoding="utf-8"?>
-<p:sld xmlns:a="http://schemas.openxmlformats.org/drawingml/2006/main" xmlns:r="http://schemas.openxmlformats.org/officeDocument/2006/relationships" xmlns:p="http://schemas.openxmlformats.org/presentationml/2006/main">
-  <p:cSld>
-    <p:spTree>
-      <p:nvGrpSpPr>
-        <p:cNvPr id="1" name=""/>
-        <p:cNvGrpSpPr/>
-        <p:nvPr/>
-      </p:nvGrpSpPr>
-      <p:grpSpPr>
-        <a:xfrm>
-          <a:off x="0" y="0"/>
-          <a:ext cx="0" cy="0"/>
-          <a:chOff x="0" y="0"/>
-          <a:chExt cx="0" cy="0"/>
-        </a:xfrm>
-      </p:grpSpPr>
-      <p:sp>
-        <p:nvSpPr>
-          <p:cNvPr id="2" name="文本占位符 1"/>
-          <p:cNvSpPr>
-            <a:spLocks noGrp="1"/>
-          </p:cNvSpPr>
-          <p:nvPr>
-            <p:ph type="body" sz="quarter" idx="12"/>
-          </p:nvPr>
-        </p:nvSpPr>
-        <p:spPr/>
-        <p:txBody>
-          <a:bodyPr/>
-          <a:lstStyle/>
-          <a:p>
-            <a:pPr algn="just"/>
-            <a:r>
-              <a:rPr lang="en-US" altLang="zh-CN" sz="3200" dirty="0" smtClean="0"/>
-              <a:t>With the </a:t>
-            </a:r>
-            <a:r>
-              <a:rPr lang="en-US" altLang="zh-CN" sz="3200" dirty="0" err="1" smtClean="0"/>
-              <a:t>reachtube</a:t>
-            </a:r>
-            <a:r>
-              <a:rPr lang="en-US" altLang="zh-CN" sz="3200" dirty="0" smtClean="0"/>
-              <a:t> computed, it is possible to obtain a bound for the error of tracking the reference trajectory. </a:t>
-            </a:r>
-          </a:p>
-          <a:p>
-            <a:pPr algn="just"/>
-            <a:endParaRPr lang="en-US" altLang="zh-CN" sz="3200" dirty="0"/>
-          </a:p>
-          <a:p>
-            <a:pPr algn="just"/>
-            <a:r>
-              <a:rPr lang="en-US" altLang="zh-CN" sz="3200" dirty="0" smtClean="0"/>
-              <a:t>The next step is to generate a reference trajectory that the vehicle can follow and can reach the goal. </a:t>
-            </a:r>
-          </a:p>
-        </p:txBody>
-      </p:sp>
-      <p:sp>
-        <p:nvSpPr>
-          <p:cNvPr id="3" name="文本占位符 2"/>
-          <p:cNvSpPr>
-            <a:spLocks noGrp="1"/>
-          </p:cNvSpPr>
-          <p:nvPr>
-            <p:ph type="body" sz="quarter" idx="10"/>
-          </p:nvPr>
-        </p:nvSpPr>
-        <p:spPr/>
-        <p:txBody>
-          <a:bodyPr/>
-          <a:lstStyle/>
-          <a:p>
-            <a:r>
-              <a:rPr lang="en-US" altLang="zh-CN" dirty="0" smtClean="0"/>
-              <a:t>Next Step	</a:t>
-            </a:r>
-            <a:endParaRPr lang="zh-CN" altLang="en-US" dirty="0"/>
-          </a:p>
-        </p:txBody>
-      </p:sp>
-      <p:sp>
-        <p:nvSpPr>
-          <p:cNvPr id="4" name="灯片编号占位符 3"/>
-          <p:cNvSpPr>
-            <a:spLocks noGrp="1"/>
-          </p:cNvSpPr>
-          <p:nvPr>
-            <p:ph type="sldNum" sz="quarter" idx="4"/>
-          </p:nvPr>
-        </p:nvSpPr>
-        <p:spPr/>
-        <p:txBody>
-          <a:bodyPr/>
-          <a:lstStyle/>
-          <a:p>
-            <a:fld id="{7DAA0FC6-F71F-4650-BE21-9A15F164E712}" type="slidenum">
-              <a:rPr lang="en-US" smtClean="0"/>
-              <a:pPr/>
-              <a:t>8</a:t>
-            </a:fld>
-            <a:endParaRPr lang="en-US" dirty="0"/>
-          </a:p>
-        </p:txBody>
-      </p:sp>
-    </p:spTree>
-    <p:extLst>
-      <p:ext uri="{BB962C8B-B14F-4D97-AF65-F5344CB8AC3E}">
-        <p14:creationId xmlns:p14="http://schemas.microsoft.com/office/powerpoint/2010/main" val="1400447984"/>
       </p:ext>
     </p:extLst>
   </p:cSld>

</xml_diff>